<commit_message>
03 Sorting Algorithms updated: added binary search
</commit_message>
<xml_diff>
--- a/03_search_algorithms/03_search_algorithms.pptx
+++ b/03_search_algorithms/03_search_algorithms.pptx
@@ -7,9 +7,12 @@
   <p:sldIdLst>
     <p:sldId id="263" r:id="rId2"/>
     <p:sldId id="264" r:id="rId3"/>
-    <p:sldId id="272" r:id="rId4"/>
-    <p:sldId id="273" r:id="rId5"/>
-    <p:sldId id="265" r:id="rId6"/>
+    <p:sldId id="276" r:id="rId4"/>
+    <p:sldId id="272" r:id="rId5"/>
+    <p:sldId id="273" r:id="rId6"/>
+    <p:sldId id="265" r:id="rId7"/>
+    <p:sldId id="274" r:id="rId8"/>
+    <p:sldId id="275" r:id="rId9"/>
   </p:sldIdLst>
   <p:sldSz cx="12192000" cy="6858000"/>
   <p:notesSz cx="6858000" cy="9144000"/>
@@ -109,6 +112,26 @@
     </a:lvl9pPr>
   </p:defaultTextStyle>
   <p:extLst>
+    <p:ext uri="{521415D9-36F7-43E2-AB2F-B90AF26B5E84}">
+      <p14:sectionLst xmlns:p14="http://schemas.microsoft.com/office/powerpoint/2010/main">
+        <p14:section name="Раздел по умолчанию" id="{A918C7E6-2544-4F68-B63D-E22E68C4D7E9}">
+          <p14:sldIdLst>
+            <p14:sldId id="263"/>
+            <p14:sldId id="264"/>
+            <p14:sldId id="276"/>
+            <p14:sldId id="272"/>
+            <p14:sldId id="273"/>
+          </p14:sldIdLst>
+        </p14:section>
+        <p14:section name="Binary search" id="{D7D23B12-6B43-47FE-95C6-D9B2E8F71500}">
+          <p14:sldIdLst>
+            <p14:sldId id="265"/>
+            <p14:sldId id="274"/>
+            <p14:sldId id="275"/>
+          </p14:sldIdLst>
+        </p14:section>
+      </p14:sectionLst>
+    </p:ext>
     <p:ext uri="{EFAFB233-063F-42B5-8137-9DF3F51BA10A}">
       <p15:sldGuideLst xmlns:p15="http://schemas.microsoft.com/office/powerpoint/2012/main"/>
     </p:ext>
@@ -263,7 +286,7 @@
           <a:p>
             <a:fld id="{CB7CFBFF-8D01-415A-97A6-3024B328D643}" type="datetimeFigureOut">
               <a:rPr lang="ru-RU" smtClean="0"/>
-              <a:t>16.02.2023</a:t>
+              <a:t>21.02.2023</a:t>
             </a:fld>
             <a:endParaRPr lang="ru-RU"/>
           </a:p>
@@ -461,7 +484,7 @@
           <a:p>
             <a:fld id="{CB7CFBFF-8D01-415A-97A6-3024B328D643}" type="datetimeFigureOut">
               <a:rPr lang="ru-RU" smtClean="0"/>
-              <a:t>16.02.2023</a:t>
+              <a:t>21.02.2023</a:t>
             </a:fld>
             <a:endParaRPr lang="ru-RU"/>
           </a:p>
@@ -669,7 +692,7 @@
           <a:p>
             <a:fld id="{CB7CFBFF-8D01-415A-97A6-3024B328D643}" type="datetimeFigureOut">
               <a:rPr lang="ru-RU" smtClean="0"/>
-              <a:t>16.02.2023</a:t>
+              <a:t>21.02.2023</a:t>
             </a:fld>
             <a:endParaRPr lang="ru-RU"/>
           </a:p>
@@ -867,7 +890,7 @@
           <a:p>
             <a:fld id="{CB7CFBFF-8D01-415A-97A6-3024B328D643}" type="datetimeFigureOut">
               <a:rPr lang="ru-RU" smtClean="0"/>
-              <a:t>16.02.2023</a:t>
+              <a:t>21.02.2023</a:t>
             </a:fld>
             <a:endParaRPr lang="ru-RU"/>
           </a:p>
@@ -1142,7 +1165,7 @@
           <a:p>
             <a:fld id="{CB7CFBFF-8D01-415A-97A6-3024B328D643}" type="datetimeFigureOut">
               <a:rPr lang="ru-RU" smtClean="0"/>
-              <a:t>16.02.2023</a:t>
+              <a:t>21.02.2023</a:t>
             </a:fld>
             <a:endParaRPr lang="ru-RU"/>
           </a:p>
@@ -1407,7 +1430,7 @@
           <a:p>
             <a:fld id="{CB7CFBFF-8D01-415A-97A6-3024B328D643}" type="datetimeFigureOut">
               <a:rPr lang="ru-RU" smtClean="0"/>
-              <a:t>16.02.2023</a:t>
+              <a:t>21.02.2023</a:t>
             </a:fld>
             <a:endParaRPr lang="ru-RU"/>
           </a:p>
@@ -1819,7 +1842,7 @@
           <a:p>
             <a:fld id="{CB7CFBFF-8D01-415A-97A6-3024B328D643}" type="datetimeFigureOut">
               <a:rPr lang="ru-RU" smtClean="0"/>
-              <a:t>16.02.2023</a:t>
+              <a:t>21.02.2023</a:t>
             </a:fld>
             <a:endParaRPr lang="ru-RU"/>
           </a:p>
@@ -1960,7 +1983,7 @@
           <a:p>
             <a:fld id="{CB7CFBFF-8D01-415A-97A6-3024B328D643}" type="datetimeFigureOut">
               <a:rPr lang="ru-RU" smtClean="0"/>
-              <a:t>16.02.2023</a:t>
+              <a:t>21.02.2023</a:t>
             </a:fld>
             <a:endParaRPr lang="ru-RU"/>
           </a:p>
@@ -2073,7 +2096,7 @@
           <a:p>
             <a:fld id="{CB7CFBFF-8D01-415A-97A6-3024B328D643}" type="datetimeFigureOut">
               <a:rPr lang="ru-RU" smtClean="0"/>
-              <a:t>16.02.2023</a:t>
+              <a:t>21.02.2023</a:t>
             </a:fld>
             <a:endParaRPr lang="ru-RU"/>
           </a:p>
@@ -2384,7 +2407,7 @@
           <a:p>
             <a:fld id="{CB7CFBFF-8D01-415A-97A6-3024B328D643}" type="datetimeFigureOut">
               <a:rPr lang="ru-RU" smtClean="0"/>
-              <a:t>16.02.2023</a:t>
+              <a:t>21.02.2023</a:t>
             </a:fld>
             <a:endParaRPr lang="ru-RU"/>
           </a:p>
@@ -2672,7 +2695,7 @@
           <a:p>
             <a:fld id="{CB7CFBFF-8D01-415A-97A6-3024B328D643}" type="datetimeFigureOut">
               <a:rPr lang="ru-RU" smtClean="0"/>
-              <a:t>16.02.2023</a:t>
+              <a:t>21.02.2023</a:t>
             </a:fld>
             <a:endParaRPr lang="ru-RU"/>
           </a:p>
@@ -2913,7 +2936,7 @@
           <a:p>
             <a:fld id="{CB7CFBFF-8D01-415A-97A6-3024B328D643}" type="datetimeFigureOut">
               <a:rPr lang="ru-RU" smtClean="0"/>
-              <a:t>16.02.2023</a:t>
+              <a:t>21.02.2023</a:t>
             </a:fld>
             <a:endParaRPr lang="ru-RU"/>
           </a:p>
@@ -3698,10 +3721,10 @@
       </p:cxnSp>
       <p:sp>
         <p:nvSpPr>
-          <p:cNvPr id="23" name="TextBox 22">
-            <a:extLst>
-              <a:ext uri="{FF2B5EF4-FFF2-40B4-BE49-F238E27FC236}">
-                <a16:creationId xmlns:a16="http://schemas.microsoft.com/office/drawing/2014/main" id="{AAA2DEAF-02AF-4D90-B5DC-759F7B2809C8}"/>
+          <p:cNvPr id="2" name="TextBox 1">
+            <a:extLst>
+              <a:ext uri="{FF2B5EF4-FFF2-40B4-BE49-F238E27FC236}">
+                <a16:creationId xmlns:a16="http://schemas.microsoft.com/office/drawing/2014/main" id="{C070B77B-A085-4D54-93D1-C461EA715A67}"/>
               </a:ext>
             </a:extLst>
           </p:cNvPr>
@@ -3710,8 +3733,8 @@
         </p:nvSpPr>
         <p:spPr>
           <a:xfrm>
-            <a:off x="10458815" y="6152152"/>
-            <a:ext cx="1274773" cy="369332"/>
+            <a:off x="1079862" y="1481948"/>
+            <a:ext cx="9926805" cy="4524315"/>
           </a:xfrm>
           <a:prstGeom prst="rect">
             <a:avLst/>
@@ -3719,57 +3742,6 @@
           <a:noFill/>
         </p:spPr>
         <p:txBody>
-          <a:bodyPr wrap="none" rtlCol="0">
-            <a:spAutoFit/>
-          </a:bodyPr>
-          <a:lstStyle/>
-          <a:p>
-            <a:r>
-              <a:rPr lang="en-US" dirty="0">
-                <a:solidFill>
-                  <a:schemeClr val="accent2"/>
-                </a:solidFill>
-                <a:hlinkClick r:id="rId2">
-                  <a:extLst>
-                    <a:ext uri="{A12FA001-AC4F-418D-AE19-62706E023703}">
-                      <ahyp:hlinkClr xmlns:ahyp="http://schemas.microsoft.com/office/drawing/2018/hyperlinkcolor" val="tx"/>
-                    </a:ext>
-                  </a:extLst>
-                </a:hlinkClick>
-              </a:rPr>
-              <a:t>godbolt.org</a:t>
-            </a:r>
-            <a:endParaRPr lang="ru-RU" dirty="0">
-              <a:solidFill>
-                <a:schemeClr val="accent2"/>
-              </a:solidFill>
-            </a:endParaRPr>
-          </a:p>
-        </p:txBody>
-      </p:sp>
-      <p:sp>
-        <p:nvSpPr>
-          <p:cNvPr id="2" name="TextBox 1">
-            <a:extLst>
-              <a:ext uri="{FF2B5EF4-FFF2-40B4-BE49-F238E27FC236}">
-                <a16:creationId xmlns:a16="http://schemas.microsoft.com/office/drawing/2014/main" id="{C070B77B-A085-4D54-93D1-C461EA715A67}"/>
-              </a:ext>
-            </a:extLst>
-          </p:cNvPr>
-          <p:cNvSpPr txBox="1"/>
-          <p:nvPr/>
-        </p:nvSpPr>
-        <p:spPr>
-          <a:xfrm>
-            <a:off x="1079862" y="1481948"/>
-            <a:ext cx="9926805" cy="3046988"/>
-          </a:xfrm>
-          <a:prstGeom prst="rect">
-            <a:avLst/>
-          </a:prstGeom>
-          <a:noFill/>
-        </p:spPr>
-        <p:txBody>
           <a:bodyPr wrap="square" rtlCol="0">
             <a:spAutoFit/>
           </a:bodyPr>
@@ -3827,7 +3799,37 @@
               <a:rPr lang="ru-RU" sz="2400" dirty="0"/>
               <a:t>В конце если элемент не найден - возвращается ошибка.</a:t>
             </a:r>
-            <a:endParaRPr lang="en-US" sz="2400" dirty="0"/>
+          </a:p>
+          <a:p>
+            <a:pPr marL="342900" indent="-342900">
+              <a:buFont typeface="+mj-lt"/>
+              <a:buAutoNum type="arabicPeriod"/>
+            </a:pPr>
+            <a:endParaRPr lang="ru-RU" sz="2400" dirty="0"/>
+          </a:p>
+          <a:p>
+            <a:pPr marL="342900" indent="-342900">
+              <a:buFont typeface="+mj-lt"/>
+              <a:buAutoNum type="arabicPeriod"/>
+            </a:pPr>
+            <a:endParaRPr lang="ru-RU" sz="2400" dirty="0"/>
+          </a:p>
+          <a:p>
+            <a:pPr marL="342900" indent="-342900">
+              <a:buFont typeface="+mj-lt"/>
+              <a:buAutoNum type="arabicPeriod"/>
+            </a:pPr>
+            <a:endParaRPr lang="ru-RU" sz="2400" dirty="0"/>
+          </a:p>
+          <a:p>
+            <a:r>
+              <a:rPr lang="ru-RU" sz="2400" dirty="0"/>
+              <a:t>Сложность поиска в худшем случае </a:t>
+            </a:r>
+            <a:r>
+              <a:rPr lang="en-US" sz="2400" dirty="0"/>
+              <a:t>O(N)</a:t>
+            </a:r>
           </a:p>
         </p:txBody>
       </p:sp>
@@ -3990,521 +3992,40 @@
           </a:fontRef>
         </p:style>
       </p:cxnSp>
-      <p:sp>
-        <p:nvSpPr>
-          <p:cNvPr id="10" name="TextBox 9">
-            <a:extLst>
-              <a:ext uri="{FF2B5EF4-FFF2-40B4-BE49-F238E27FC236}">
-                <a16:creationId xmlns:a16="http://schemas.microsoft.com/office/drawing/2014/main" id="{364C1F3A-6A67-4CC1-8E54-C5EA5C77774D}"/>
-              </a:ext>
-            </a:extLst>
-          </p:cNvPr>
-          <p:cNvSpPr txBox="1"/>
+      <p:pic>
+        <p:nvPicPr>
+          <p:cNvPr id="5" name="Рисунок 4">
+            <a:extLst>
+              <a:ext uri="{FF2B5EF4-FFF2-40B4-BE49-F238E27FC236}">
+                <a16:creationId xmlns:a16="http://schemas.microsoft.com/office/drawing/2014/main" id="{9928C178-8033-4697-6066-58A6B1537ABE}"/>
+              </a:ext>
+            </a:extLst>
+          </p:cNvPr>
+          <p:cNvPicPr>
+            <a:picLocks noChangeAspect="1"/>
+          </p:cNvPicPr>
           <p:nvPr/>
-        </p:nvSpPr>
+        </p:nvPicPr>
+        <p:blipFill>
+          <a:blip r:embed="rId2"/>
+          <a:stretch>
+            <a:fillRect/>
+          </a:stretch>
+        </p:blipFill>
         <p:spPr>
           <a:xfrm>
-            <a:off x="1079862" y="1450056"/>
-            <a:ext cx="8301205" cy="2862322"/>
+            <a:off x="1079862" y="1664435"/>
+            <a:ext cx="9606003" cy="3236013"/>
           </a:xfrm>
           <a:prstGeom prst="rect">
             <a:avLst/>
           </a:prstGeom>
-          <a:noFill/>
         </p:spPr>
-        <p:txBody>
-          <a:bodyPr wrap="square">
-            <a:spAutoFit/>
-          </a:bodyPr>
-          <a:lstStyle/>
-          <a:p>
-            <a:r>
-              <a:rPr lang="en-US" b="0" dirty="0">
-                <a:solidFill>
-                  <a:srgbClr val="0000FF"/>
-                </a:solidFill>
-                <a:effectLst/>
-                <a:latin typeface="Consolas" panose="020B0609020204030204" pitchFamily="49" charset="0"/>
-              </a:rPr>
-              <a:t>void</a:t>
-            </a:r>
-            <a:r>
-              <a:rPr lang="en-US" b="0" dirty="0">
-                <a:solidFill>
-                  <a:srgbClr val="000000"/>
-                </a:solidFill>
-                <a:effectLst/>
-                <a:latin typeface="Consolas" panose="020B0609020204030204" pitchFamily="49" charset="0"/>
-              </a:rPr>
-              <a:t> </a:t>
-            </a:r>
-            <a:r>
-              <a:rPr lang="en-US" b="0" dirty="0" err="1">
-                <a:solidFill>
-                  <a:srgbClr val="000000"/>
-                </a:solidFill>
-                <a:effectLst/>
-                <a:latin typeface="Consolas" panose="020B0609020204030204" pitchFamily="49" charset="0"/>
-              </a:rPr>
-              <a:t>linear_search</a:t>
-            </a:r>
-            <a:r>
-              <a:rPr lang="en-US" b="0" dirty="0">
-                <a:solidFill>
-                  <a:srgbClr val="000000"/>
-                </a:solidFill>
-                <a:effectLst/>
-                <a:latin typeface="Consolas" panose="020B0609020204030204" pitchFamily="49" charset="0"/>
-              </a:rPr>
-              <a:t>(vector&lt;</a:t>
-            </a:r>
-            <a:r>
-              <a:rPr lang="en-US" b="0" dirty="0">
-                <a:solidFill>
-                  <a:srgbClr val="0000FF"/>
-                </a:solidFill>
-                <a:effectLst/>
-                <a:latin typeface="Consolas" panose="020B0609020204030204" pitchFamily="49" charset="0"/>
-              </a:rPr>
-              <a:t>int</a:t>
-            </a:r>
-            <a:r>
-              <a:rPr lang="en-US" b="0" dirty="0">
-                <a:solidFill>
-                  <a:srgbClr val="000000"/>
-                </a:solidFill>
-                <a:effectLst/>
-                <a:latin typeface="Consolas" panose="020B0609020204030204" pitchFamily="49" charset="0"/>
-              </a:rPr>
-              <a:t>&gt; &amp;v, </a:t>
-            </a:r>
-            <a:r>
-              <a:rPr lang="en-US" b="0" dirty="0">
-                <a:solidFill>
-                  <a:srgbClr val="0000FF"/>
-                </a:solidFill>
-                <a:effectLst/>
-                <a:latin typeface="Consolas" panose="020B0609020204030204" pitchFamily="49" charset="0"/>
-              </a:rPr>
-              <a:t>int</a:t>
-            </a:r>
-            <a:r>
-              <a:rPr lang="en-US" b="0" dirty="0">
-                <a:solidFill>
-                  <a:srgbClr val="000000"/>
-                </a:solidFill>
-                <a:effectLst/>
-                <a:latin typeface="Consolas" panose="020B0609020204030204" pitchFamily="49" charset="0"/>
-              </a:rPr>
-              <a:t> target, </a:t>
-            </a:r>
-            <a:r>
-              <a:rPr lang="en-US" b="0" dirty="0">
-                <a:solidFill>
-                  <a:srgbClr val="0000FF"/>
-                </a:solidFill>
-                <a:effectLst/>
-                <a:latin typeface="Consolas" panose="020B0609020204030204" pitchFamily="49" charset="0"/>
-              </a:rPr>
-              <a:t>int</a:t>
-            </a:r>
-            <a:r>
-              <a:rPr lang="en-US" b="0" dirty="0">
-                <a:solidFill>
-                  <a:srgbClr val="000000"/>
-                </a:solidFill>
-                <a:effectLst/>
-                <a:latin typeface="Consolas" panose="020B0609020204030204" pitchFamily="49" charset="0"/>
-              </a:rPr>
-              <a:t> *result) {</a:t>
-            </a:r>
-          </a:p>
-          <a:p>
-            <a:r>
-              <a:rPr lang="en-US" b="0" dirty="0">
-                <a:solidFill>
-                  <a:srgbClr val="000000"/>
-                </a:solidFill>
-                <a:effectLst/>
-                <a:latin typeface="Consolas" panose="020B0609020204030204" pitchFamily="49" charset="0"/>
-              </a:rPr>
-              <a:t>    </a:t>
-            </a:r>
-            <a:r>
-              <a:rPr lang="en-US" b="0" dirty="0">
-                <a:solidFill>
-                  <a:srgbClr val="0000FF"/>
-                </a:solidFill>
-                <a:effectLst/>
-                <a:latin typeface="Consolas" panose="020B0609020204030204" pitchFamily="49" charset="0"/>
-              </a:rPr>
-              <a:t>for</a:t>
-            </a:r>
-            <a:r>
-              <a:rPr lang="en-US" b="0" dirty="0">
-                <a:solidFill>
-                  <a:srgbClr val="000000"/>
-                </a:solidFill>
-                <a:effectLst/>
-                <a:latin typeface="Consolas" panose="020B0609020204030204" pitchFamily="49" charset="0"/>
-              </a:rPr>
-              <a:t> (</a:t>
-            </a:r>
-            <a:r>
-              <a:rPr lang="en-US" b="0" dirty="0">
-                <a:solidFill>
-                  <a:srgbClr val="0000FF"/>
-                </a:solidFill>
-                <a:effectLst/>
-                <a:latin typeface="Consolas" panose="020B0609020204030204" pitchFamily="49" charset="0"/>
-              </a:rPr>
-              <a:t>int</a:t>
-            </a:r>
-            <a:r>
-              <a:rPr lang="en-US" b="0" dirty="0">
-                <a:solidFill>
-                  <a:srgbClr val="000000"/>
-                </a:solidFill>
-                <a:effectLst/>
-                <a:latin typeface="Consolas" panose="020B0609020204030204" pitchFamily="49" charset="0"/>
-              </a:rPr>
-              <a:t> </a:t>
-            </a:r>
-            <a:r>
-              <a:rPr lang="en-US" b="0" dirty="0" err="1">
-                <a:solidFill>
-                  <a:srgbClr val="000000"/>
-                </a:solidFill>
-                <a:effectLst/>
-                <a:latin typeface="Consolas" panose="020B0609020204030204" pitchFamily="49" charset="0"/>
-              </a:rPr>
-              <a:t>i</a:t>
-            </a:r>
-            <a:r>
-              <a:rPr lang="en-US" b="0" dirty="0">
-                <a:solidFill>
-                  <a:srgbClr val="000000"/>
-                </a:solidFill>
-                <a:effectLst/>
-                <a:latin typeface="Consolas" panose="020B0609020204030204" pitchFamily="49" charset="0"/>
-              </a:rPr>
-              <a:t> = </a:t>
-            </a:r>
-            <a:r>
-              <a:rPr lang="en-US" b="0" dirty="0">
-                <a:solidFill>
-                  <a:srgbClr val="098658"/>
-                </a:solidFill>
-                <a:effectLst/>
-                <a:latin typeface="Consolas" panose="020B0609020204030204" pitchFamily="49" charset="0"/>
-              </a:rPr>
-              <a:t>0</a:t>
-            </a:r>
-            <a:r>
-              <a:rPr lang="en-US" b="0" dirty="0">
-                <a:solidFill>
-                  <a:srgbClr val="000000"/>
-                </a:solidFill>
-                <a:effectLst/>
-                <a:latin typeface="Consolas" panose="020B0609020204030204" pitchFamily="49" charset="0"/>
-              </a:rPr>
-              <a:t>; </a:t>
-            </a:r>
-            <a:r>
-              <a:rPr lang="en-US" b="0" dirty="0" err="1">
-                <a:solidFill>
-                  <a:srgbClr val="000000"/>
-                </a:solidFill>
-                <a:effectLst/>
-                <a:latin typeface="Consolas" panose="020B0609020204030204" pitchFamily="49" charset="0"/>
-              </a:rPr>
-              <a:t>i</a:t>
-            </a:r>
-            <a:r>
-              <a:rPr lang="en-US" b="0" dirty="0">
-                <a:solidFill>
-                  <a:srgbClr val="000000"/>
-                </a:solidFill>
-                <a:effectLst/>
-                <a:latin typeface="Consolas" panose="020B0609020204030204" pitchFamily="49" charset="0"/>
-              </a:rPr>
-              <a:t> &lt; </a:t>
-            </a:r>
-            <a:r>
-              <a:rPr lang="en-US" b="0" dirty="0" err="1">
-                <a:solidFill>
-                  <a:srgbClr val="000000"/>
-                </a:solidFill>
-                <a:effectLst/>
-                <a:latin typeface="Consolas" panose="020B0609020204030204" pitchFamily="49" charset="0"/>
-              </a:rPr>
-              <a:t>v.size</a:t>
-            </a:r>
-            <a:r>
-              <a:rPr lang="en-US" b="0" dirty="0">
-                <a:solidFill>
-                  <a:srgbClr val="000000"/>
-                </a:solidFill>
-                <a:effectLst/>
-                <a:latin typeface="Consolas" panose="020B0609020204030204" pitchFamily="49" charset="0"/>
-              </a:rPr>
-              <a:t>(); ++</a:t>
-            </a:r>
-            <a:r>
-              <a:rPr lang="en-US" b="0" dirty="0" err="1">
-                <a:solidFill>
-                  <a:srgbClr val="000000"/>
-                </a:solidFill>
-                <a:effectLst/>
-                <a:latin typeface="Consolas" panose="020B0609020204030204" pitchFamily="49" charset="0"/>
-              </a:rPr>
-              <a:t>i</a:t>
-            </a:r>
-            <a:r>
-              <a:rPr lang="en-US" b="0" dirty="0">
-                <a:solidFill>
-                  <a:srgbClr val="000000"/>
-                </a:solidFill>
-                <a:effectLst/>
-                <a:latin typeface="Consolas" panose="020B0609020204030204" pitchFamily="49" charset="0"/>
-              </a:rPr>
-              <a:t>) {</a:t>
-            </a:r>
-          </a:p>
-          <a:p>
-            <a:r>
-              <a:rPr lang="en-US" b="0" dirty="0">
-                <a:solidFill>
-                  <a:srgbClr val="000000"/>
-                </a:solidFill>
-                <a:effectLst/>
-                <a:latin typeface="Consolas" panose="020B0609020204030204" pitchFamily="49" charset="0"/>
-              </a:rPr>
-              <a:t>        </a:t>
-            </a:r>
-            <a:r>
-              <a:rPr lang="en-US" b="0" dirty="0">
-                <a:solidFill>
-                  <a:srgbClr val="0000FF"/>
-                </a:solidFill>
-                <a:effectLst/>
-                <a:latin typeface="Consolas" panose="020B0609020204030204" pitchFamily="49" charset="0"/>
-              </a:rPr>
-              <a:t>if</a:t>
-            </a:r>
-            <a:r>
-              <a:rPr lang="en-US" b="0" dirty="0">
-                <a:solidFill>
-                  <a:srgbClr val="000000"/>
-                </a:solidFill>
-                <a:effectLst/>
-                <a:latin typeface="Consolas" panose="020B0609020204030204" pitchFamily="49" charset="0"/>
-              </a:rPr>
-              <a:t> (target == v[</a:t>
-            </a:r>
-            <a:r>
-              <a:rPr lang="en-US" b="0" dirty="0" err="1">
-                <a:solidFill>
-                  <a:srgbClr val="000000"/>
-                </a:solidFill>
-                <a:effectLst/>
-                <a:latin typeface="Consolas" panose="020B0609020204030204" pitchFamily="49" charset="0"/>
-              </a:rPr>
-              <a:t>i</a:t>
-            </a:r>
-            <a:r>
-              <a:rPr lang="en-US" b="0" dirty="0">
-                <a:solidFill>
-                  <a:srgbClr val="000000"/>
-                </a:solidFill>
-                <a:effectLst/>
-                <a:latin typeface="Consolas" panose="020B0609020204030204" pitchFamily="49" charset="0"/>
-              </a:rPr>
-              <a:t>]) {</a:t>
-            </a:r>
-          </a:p>
-          <a:p>
-            <a:r>
-              <a:rPr lang="en-US" b="0" dirty="0">
-                <a:solidFill>
-                  <a:srgbClr val="000000"/>
-                </a:solidFill>
-                <a:effectLst/>
-                <a:latin typeface="Consolas" panose="020B0609020204030204" pitchFamily="49" charset="0"/>
-              </a:rPr>
-              <a:t>            *result = </a:t>
-            </a:r>
-            <a:r>
-              <a:rPr lang="en-US" b="0" dirty="0" err="1">
-                <a:solidFill>
-                  <a:srgbClr val="000000"/>
-                </a:solidFill>
-                <a:effectLst/>
-                <a:latin typeface="Consolas" panose="020B0609020204030204" pitchFamily="49" charset="0"/>
-              </a:rPr>
-              <a:t>i</a:t>
-            </a:r>
-            <a:r>
-              <a:rPr lang="en-US" b="0" dirty="0">
-                <a:solidFill>
-                  <a:srgbClr val="000000"/>
-                </a:solidFill>
-                <a:effectLst/>
-                <a:latin typeface="Consolas" panose="020B0609020204030204" pitchFamily="49" charset="0"/>
-              </a:rPr>
-              <a:t>;</a:t>
-            </a:r>
-          </a:p>
-          <a:p>
-            <a:r>
-              <a:rPr lang="en-US" b="0" dirty="0">
-                <a:solidFill>
-                  <a:srgbClr val="000000"/>
-                </a:solidFill>
-                <a:effectLst/>
-                <a:latin typeface="Consolas" panose="020B0609020204030204" pitchFamily="49" charset="0"/>
-              </a:rPr>
-              <a:t>            </a:t>
-            </a:r>
-            <a:r>
-              <a:rPr lang="en-US" b="0" dirty="0">
-                <a:solidFill>
-                  <a:srgbClr val="0000FF"/>
-                </a:solidFill>
-                <a:effectLst/>
-                <a:latin typeface="Consolas" panose="020B0609020204030204" pitchFamily="49" charset="0"/>
-              </a:rPr>
-              <a:t>return</a:t>
-            </a:r>
-            <a:r>
-              <a:rPr lang="en-US" b="0" dirty="0">
-                <a:solidFill>
-                  <a:srgbClr val="000000"/>
-                </a:solidFill>
-                <a:effectLst/>
-                <a:latin typeface="Consolas" panose="020B0609020204030204" pitchFamily="49" charset="0"/>
-              </a:rPr>
-              <a:t>;</a:t>
-            </a:r>
-          </a:p>
-          <a:p>
-            <a:r>
-              <a:rPr lang="en-US" b="0" dirty="0">
-                <a:solidFill>
-                  <a:srgbClr val="000000"/>
-                </a:solidFill>
-                <a:effectLst/>
-                <a:latin typeface="Consolas" panose="020B0609020204030204" pitchFamily="49" charset="0"/>
-              </a:rPr>
-              <a:t>        }</a:t>
-            </a:r>
-          </a:p>
-          <a:p>
-            <a:r>
-              <a:rPr lang="en-US" b="0" dirty="0">
-                <a:solidFill>
-                  <a:srgbClr val="000000"/>
-                </a:solidFill>
-                <a:effectLst/>
-                <a:latin typeface="Consolas" panose="020B0609020204030204" pitchFamily="49" charset="0"/>
-              </a:rPr>
-              <a:t>    }</a:t>
-            </a:r>
-          </a:p>
-          <a:p>
-            <a:br>
-              <a:rPr lang="en-US" b="0" dirty="0">
-                <a:solidFill>
-                  <a:srgbClr val="000000"/>
-                </a:solidFill>
-                <a:effectLst/>
-                <a:latin typeface="Consolas" panose="020B0609020204030204" pitchFamily="49" charset="0"/>
-              </a:rPr>
-            </a:br>
-            <a:r>
-              <a:rPr lang="en-US" b="0" dirty="0">
-                <a:solidFill>
-                  <a:srgbClr val="000000"/>
-                </a:solidFill>
-                <a:effectLst/>
-                <a:latin typeface="Consolas" panose="020B0609020204030204" pitchFamily="49" charset="0"/>
-              </a:rPr>
-              <a:t>    result = </a:t>
-            </a:r>
-            <a:r>
-              <a:rPr lang="en-US" b="0" dirty="0" err="1">
-                <a:solidFill>
-                  <a:srgbClr val="0000FF"/>
-                </a:solidFill>
-                <a:effectLst/>
-                <a:latin typeface="Consolas" panose="020B0609020204030204" pitchFamily="49" charset="0"/>
-              </a:rPr>
-              <a:t>nullptr</a:t>
-            </a:r>
-            <a:r>
-              <a:rPr lang="en-US" b="0" dirty="0">
-                <a:solidFill>
-                  <a:srgbClr val="000000"/>
-                </a:solidFill>
-                <a:effectLst/>
-                <a:latin typeface="Consolas" panose="020B0609020204030204" pitchFamily="49" charset="0"/>
-              </a:rPr>
-              <a:t>;</a:t>
-            </a:r>
-          </a:p>
-          <a:p>
-            <a:r>
-              <a:rPr lang="en-US" b="0" dirty="0">
-                <a:solidFill>
-                  <a:srgbClr val="000000"/>
-                </a:solidFill>
-                <a:effectLst/>
-                <a:latin typeface="Consolas" panose="020B0609020204030204" pitchFamily="49" charset="0"/>
-              </a:rPr>
-              <a:t>}</a:t>
-            </a:r>
-          </a:p>
-        </p:txBody>
-      </p:sp>
-      <p:sp>
-        <p:nvSpPr>
-          <p:cNvPr id="5" name="TextBox 4">
-            <a:extLst>
-              <a:ext uri="{FF2B5EF4-FFF2-40B4-BE49-F238E27FC236}">
-                <a16:creationId xmlns:a16="http://schemas.microsoft.com/office/drawing/2014/main" id="{006351EF-71BA-4B94-9566-07E2FB28D499}"/>
-              </a:ext>
-            </a:extLst>
-          </p:cNvPr>
-          <p:cNvSpPr txBox="1"/>
-          <p:nvPr/>
-        </p:nvSpPr>
-        <p:spPr>
-          <a:xfrm>
-            <a:off x="1079862" y="4498050"/>
-            <a:ext cx="1860381" cy="369332"/>
-          </a:xfrm>
-          <a:prstGeom prst="rect">
-            <a:avLst/>
-          </a:prstGeom>
-          <a:noFill/>
-        </p:spPr>
-        <p:txBody>
-          <a:bodyPr wrap="none" rtlCol="0">
-            <a:spAutoFit/>
-          </a:bodyPr>
-          <a:lstStyle/>
-          <a:p>
-            <a:r>
-              <a:rPr lang="ru-RU" dirty="0"/>
-              <a:t>А можно проще?</a:t>
-            </a:r>
-          </a:p>
-        </p:txBody>
-      </p:sp>
+      </p:pic>
     </p:spTree>
     <p:extLst>
       <p:ext uri="{BB962C8B-B14F-4D97-AF65-F5344CB8AC3E}">
-        <p14:creationId xmlns:p14="http://schemas.microsoft.com/office/powerpoint/2010/main" val="36929741"/>
+        <p14:creationId xmlns:p14="http://schemas.microsoft.com/office/powerpoint/2010/main" val="3303128989"/>
       </p:ext>
     </p:extLst>
   </p:cSld>
@@ -4662,10 +4183,521 @@
       </p:cxnSp>
       <p:sp>
         <p:nvSpPr>
-          <p:cNvPr id="23" name="TextBox 22">
-            <a:extLst>
-              <a:ext uri="{FF2B5EF4-FFF2-40B4-BE49-F238E27FC236}">
-                <a16:creationId xmlns:a16="http://schemas.microsoft.com/office/drawing/2014/main" id="{AAA2DEAF-02AF-4D90-B5DC-759F7B2809C8}"/>
+          <p:cNvPr id="10" name="TextBox 9">
+            <a:extLst>
+              <a:ext uri="{FF2B5EF4-FFF2-40B4-BE49-F238E27FC236}">
+                <a16:creationId xmlns:a16="http://schemas.microsoft.com/office/drawing/2014/main" id="{364C1F3A-6A67-4CC1-8E54-C5EA5C77774D}"/>
+              </a:ext>
+            </a:extLst>
+          </p:cNvPr>
+          <p:cNvSpPr txBox="1"/>
+          <p:nvPr/>
+        </p:nvSpPr>
+        <p:spPr>
+          <a:xfrm>
+            <a:off x="1079862" y="1450056"/>
+            <a:ext cx="8301205" cy="2862322"/>
+          </a:xfrm>
+          <a:prstGeom prst="rect">
+            <a:avLst/>
+          </a:prstGeom>
+          <a:noFill/>
+        </p:spPr>
+        <p:txBody>
+          <a:bodyPr wrap="square">
+            <a:spAutoFit/>
+          </a:bodyPr>
+          <a:lstStyle/>
+          <a:p>
+            <a:r>
+              <a:rPr lang="en-US" b="0" dirty="0">
+                <a:solidFill>
+                  <a:srgbClr val="0000FF"/>
+                </a:solidFill>
+                <a:effectLst/>
+                <a:latin typeface="Consolas" panose="020B0609020204030204" pitchFamily="49" charset="0"/>
+              </a:rPr>
+              <a:t>void</a:t>
+            </a:r>
+            <a:r>
+              <a:rPr lang="en-US" b="0" dirty="0">
+                <a:solidFill>
+                  <a:srgbClr val="000000"/>
+                </a:solidFill>
+                <a:effectLst/>
+                <a:latin typeface="Consolas" panose="020B0609020204030204" pitchFamily="49" charset="0"/>
+              </a:rPr>
+              <a:t> </a:t>
+            </a:r>
+            <a:r>
+              <a:rPr lang="en-US" b="0" dirty="0" err="1">
+                <a:solidFill>
+                  <a:srgbClr val="000000"/>
+                </a:solidFill>
+                <a:effectLst/>
+                <a:latin typeface="Consolas" panose="020B0609020204030204" pitchFamily="49" charset="0"/>
+              </a:rPr>
+              <a:t>linear_search</a:t>
+            </a:r>
+            <a:r>
+              <a:rPr lang="en-US" b="0" dirty="0">
+                <a:solidFill>
+                  <a:srgbClr val="000000"/>
+                </a:solidFill>
+                <a:effectLst/>
+                <a:latin typeface="Consolas" panose="020B0609020204030204" pitchFamily="49" charset="0"/>
+              </a:rPr>
+              <a:t>(vector&lt;</a:t>
+            </a:r>
+            <a:r>
+              <a:rPr lang="en-US" b="0" dirty="0">
+                <a:solidFill>
+                  <a:srgbClr val="0000FF"/>
+                </a:solidFill>
+                <a:effectLst/>
+                <a:latin typeface="Consolas" panose="020B0609020204030204" pitchFamily="49" charset="0"/>
+              </a:rPr>
+              <a:t>int</a:t>
+            </a:r>
+            <a:r>
+              <a:rPr lang="en-US" b="0" dirty="0">
+                <a:solidFill>
+                  <a:srgbClr val="000000"/>
+                </a:solidFill>
+                <a:effectLst/>
+                <a:latin typeface="Consolas" panose="020B0609020204030204" pitchFamily="49" charset="0"/>
+              </a:rPr>
+              <a:t>&gt; &amp;v, </a:t>
+            </a:r>
+            <a:r>
+              <a:rPr lang="en-US" b="0" dirty="0">
+                <a:solidFill>
+                  <a:srgbClr val="0000FF"/>
+                </a:solidFill>
+                <a:effectLst/>
+                <a:latin typeface="Consolas" panose="020B0609020204030204" pitchFamily="49" charset="0"/>
+              </a:rPr>
+              <a:t>int</a:t>
+            </a:r>
+            <a:r>
+              <a:rPr lang="en-US" b="0" dirty="0">
+                <a:solidFill>
+                  <a:srgbClr val="000000"/>
+                </a:solidFill>
+                <a:effectLst/>
+                <a:latin typeface="Consolas" panose="020B0609020204030204" pitchFamily="49" charset="0"/>
+              </a:rPr>
+              <a:t> target, </a:t>
+            </a:r>
+            <a:r>
+              <a:rPr lang="en-US" b="0" dirty="0">
+                <a:solidFill>
+                  <a:srgbClr val="0000FF"/>
+                </a:solidFill>
+                <a:effectLst/>
+                <a:latin typeface="Consolas" panose="020B0609020204030204" pitchFamily="49" charset="0"/>
+              </a:rPr>
+              <a:t>int</a:t>
+            </a:r>
+            <a:r>
+              <a:rPr lang="en-US" b="0" dirty="0">
+                <a:solidFill>
+                  <a:srgbClr val="000000"/>
+                </a:solidFill>
+                <a:effectLst/>
+                <a:latin typeface="Consolas" panose="020B0609020204030204" pitchFamily="49" charset="0"/>
+              </a:rPr>
+              <a:t> *result) {</a:t>
+            </a:r>
+          </a:p>
+          <a:p>
+            <a:r>
+              <a:rPr lang="en-US" b="0" dirty="0">
+                <a:solidFill>
+                  <a:srgbClr val="000000"/>
+                </a:solidFill>
+                <a:effectLst/>
+                <a:latin typeface="Consolas" panose="020B0609020204030204" pitchFamily="49" charset="0"/>
+              </a:rPr>
+              <a:t>    </a:t>
+            </a:r>
+            <a:r>
+              <a:rPr lang="en-US" b="0" dirty="0">
+                <a:solidFill>
+                  <a:srgbClr val="0000FF"/>
+                </a:solidFill>
+                <a:effectLst/>
+                <a:latin typeface="Consolas" panose="020B0609020204030204" pitchFamily="49" charset="0"/>
+              </a:rPr>
+              <a:t>for</a:t>
+            </a:r>
+            <a:r>
+              <a:rPr lang="en-US" b="0" dirty="0">
+                <a:solidFill>
+                  <a:srgbClr val="000000"/>
+                </a:solidFill>
+                <a:effectLst/>
+                <a:latin typeface="Consolas" panose="020B0609020204030204" pitchFamily="49" charset="0"/>
+              </a:rPr>
+              <a:t> (</a:t>
+            </a:r>
+            <a:r>
+              <a:rPr lang="en-US" b="0" dirty="0">
+                <a:solidFill>
+                  <a:srgbClr val="0000FF"/>
+                </a:solidFill>
+                <a:effectLst/>
+                <a:latin typeface="Consolas" panose="020B0609020204030204" pitchFamily="49" charset="0"/>
+              </a:rPr>
+              <a:t>int</a:t>
+            </a:r>
+            <a:r>
+              <a:rPr lang="en-US" b="0" dirty="0">
+                <a:solidFill>
+                  <a:srgbClr val="000000"/>
+                </a:solidFill>
+                <a:effectLst/>
+                <a:latin typeface="Consolas" panose="020B0609020204030204" pitchFamily="49" charset="0"/>
+              </a:rPr>
+              <a:t> </a:t>
+            </a:r>
+            <a:r>
+              <a:rPr lang="en-US" b="0" dirty="0" err="1">
+                <a:solidFill>
+                  <a:srgbClr val="000000"/>
+                </a:solidFill>
+                <a:effectLst/>
+                <a:latin typeface="Consolas" panose="020B0609020204030204" pitchFamily="49" charset="0"/>
+              </a:rPr>
+              <a:t>i</a:t>
+            </a:r>
+            <a:r>
+              <a:rPr lang="en-US" b="0" dirty="0">
+                <a:solidFill>
+                  <a:srgbClr val="000000"/>
+                </a:solidFill>
+                <a:effectLst/>
+                <a:latin typeface="Consolas" panose="020B0609020204030204" pitchFamily="49" charset="0"/>
+              </a:rPr>
+              <a:t> = </a:t>
+            </a:r>
+            <a:r>
+              <a:rPr lang="en-US" b="0" dirty="0">
+                <a:solidFill>
+                  <a:srgbClr val="098658"/>
+                </a:solidFill>
+                <a:effectLst/>
+                <a:latin typeface="Consolas" panose="020B0609020204030204" pitchFamily="49" charset="0"/>
+              </a:rPr>
+              <a:t>0</a:t>
+            </a:r>
+            <a:r>
+              <a:rPr lang="en-US" b="0" dirty="0">
+                <a:solidFill>
+                  <a:srgbClr val="000000"/>
+                </a:solidFill>
+                <a:effectLst/>
+                <a:latin typeface="Consolas" panose="020B0609020204030204" pitchFamily="49" charset="0"/>
+              </a:rPr>
+              <a:t>; </a:t>
+            </a:r>
+            <a:r>
+              <a:rPr lang="en-US" b="0" dirty="0" err="1">
+                <a:solidFill>
+                  <a:srgbClr val="000000"/>
+                </a:solidFill>
+                <a:effectLst/>
+                <a:latin typeface="Consolas" panose="020B0609020204030204" pitchFamily="49" charset="0"/>
+              </a:rPr>
+              <a:t>i</a:t>
+            </a:r>
+            <a:r>
+              <a:rPr lang="en-US" b="0" dirty="0">
+                <a:solidFill>
+                  <a:srgbClr val="000000"/>
+                </a:solidFill>
+                <a:effectLst/>
+                <a:latin typeface="Consolas" panose="020B0609020204030204" pitchFamily="49" charset="0"/>
+              </a:rPr>
+              <a:t> &lt; </a:t>
+            </a:r>
+            <a:r>
+              <a:rPr lang="en-US" b="0" dirty="0" err="1">
+                <a:solidFill>
+                  <a:srgbClr val="000000"/>
+                </a:solidFill>
+                <a:effectLst/>
+                <a:latin typeface="Consolas" panose="020B0609020204030204" pitchFamily="49" charset="0"/>
+              </a:rPr>
+              <a:t>v.size</a:t>
+            </a:r>
+            <a:r>
+              <a:rPr lang="en-US" b="0" dirty="0">
+                <a:solidFill>
+                  <a:srgbClr val="000000"/>
+                </a:solidFill>
+                <a:effectLst/>
+                <a:latin typeface="Consolas" panose="020B0609020204030204" pitchFamily="49" charset="0"/>
+              </a:rPr>
+              <a:t>(); ++</a:t>
+            </a:r>
+            <a:r>
+              <a:rPr lang="en-US" b="0" dirty="0" err="1">
+                <a:solidFill>
+                  <a:srgbClr val="000000"/>
+                </a:solidFill>
+                <a:effectLst/>
+                <a:latin typeface="Consolas" panose="020B0609020204030204" pitchFamily="49" charset="0"/>
+              </a:rPr>
+              <a:t>i</a:t>
+            </a:r>
+            <a:r>
+              <a:rPr lang="en-US" b="0" dirty="0">
+                <a:solidFill>
+                  <a:srgbClr val="000000"/>
+                </a:solidFill>
+                <a:effectLst/>
+                <a:latin typeface="Consolas" panose="020B0609020204030204" pitchFamily="49" charset="0"/>
+              </a:rPr>
+              <a:t>) {</a:t>
+            </a:r>
+          </a:p>
+          <a:p>
+            <a:r>
+              <a:rPr lang="en-US" b="0" dirty="0">
+                <a:solidFill>
+                  <a:srgbClr val="000000"/>
+                </a:solidFill>
+                <a:effectLst/>
+                <a:latin typeface="Consolas" panose="020B0609020204030204" pitchFamily="49" charset="0"/>
+              </a:rPr>
+              <a:t>        </a:t>
+            </a:r>
+            <a:r>
+              <a:rPr lang="en-US" b="0" dirty="0">
+                <a:solidFill>
+                  <a:srgbClr val="0000FF"/>
+                </a:solidFill>
+                <a:effectLst/>
+                <a:latin typeface="Consolas" panose="020B0609020204030204" pitchFamily="49" charset="0"/>
+              </a:rPr>
+              <a:t>if</a:t>
+            </a:r>
+            <a:r>
+              <a:rPr lang="en-US" b="0" dirty="0">
+                <a:solidFill>
+                  <a:srgbClr val="000000"/>
+                </a:solidFill>
+                <a:effectLst/>
+                <a:latin typeface="Consolas" panose="020B0609020204030204" pitchFamily="49" charset="0"/>
+              </a:rPr>
+              <a:t> (target == v[</a:t>
+            </a:r>
+            <a:r>
+              <a:rPr lang="en-US" b="0" dirty="0" err="1">
+                <a:solidFill>
+                  <a:srgbClr val="000000"/>
+                </a:solidFill>
+                <a:effectLst/>
+                <a:latin typeface="Consolas" panose="020B0609020204030204" pitchFamily="49" charset="0"/>
+              </a:rPr>
+              <a:t>i</a:t>
+            </a:r>
+            <a:r>
+              <a:rPr lang="en-US" b="0" dirty="0">
+                <a:solidFill>
+                  <a:srgbClr val="000000"/>
+                </a:solidFill>
+                <a:effectLst/>
+                <a:latin typeface="Consolas" panose="020B0609020204030204" pitchFamily="49" charset="0"/>
+              </a:rPr>
+              <a:t>]) {</a:t>
+            </a:r>
+          </a:p>
+          <a:p>
+            <a:r>
+              <a:rPr lang="en-US" b="0" dirty="0">
+                <a:solidFill>
+                  <a:srgbClr val="000000"/>
+                </a:solidFill>
+                <a:effectLst/>
+                <a:latin typeface="Consolas" panose="020B0609020204030204" pitchFamily="49" charset="0"/>
+              </a:rPr>
+              <a:t>            *result = </a:t>
+            </a:r>
+            <a:r>
+              <a:rPr lang="en-US" b="0" dirty="0" err="1">
+                <a:solidFill>
+                  <a:srgbClr val="000000"/>
+                </a:solidFill>
+                <a:effectLst/>
+                <a:latin typeface="Consolas" panose="020B0609020204030204" pitchFamily="49" charset="0"/>
+              </a:rPr>
+              <a:t>i</a:t>
+            </a:r>
+            <a:r>
+              <a:rPr lang="en-US" b="0" dirty="0">
+                <a:solidFill>
+                  <a:srgbClr val="000000"/>
+                </a:solidFill>
+                <a:effectLst/>
+                <a:latin typeface="Consolas" panose="020B0609020204030204" pitchFamily="49" charset="0"/>
+              </a:rPr>
+              <a:t>;</a:t>
+            </a:r>
+          </a:p>
+          <a:p>
+            <a:r>
+              <a:rPr lang="en-US" b="0" dirty="0">
+                <a:solidFill>
+                  <a:srgbClr val="000000"/>
+                </a:solidFill>
+                <a:effectLst/>
+                <a:latin typeface="Consolas" panose="020B0609020204030204" pitchFamily="49" charset="0"/>
+              </a:rPr>
+              <a:t>            </a:t>
+            </a:r>
+            <a:r>
+              <a:rPr lang="en-US" b="0" dirty="0">
+                <a:solidFill>
+                  <a:srgbClr val="0000FF"/>
+                </a:solidFill>
+                <a:effectLst/>
+                <a:latin typeface="Consolas" panose="020B0609020204030204" pitchFamily="49" charset="0"/>
+              </a:rPr>
+              <a:t>return</a:t>
+            </a:r>
+            <a:r>
+              <a:rPr lang="en-US" b="0" dirty="0">
+                <a:solidFill>
+                  <a:srgbClr val="000000"/>
+                </a:solidFill>
+                <a:effectLst/>
+                <a:latin typeface="Consolas" panose="020B0609020204030204" pitchFamily="49" charset="0"/>
+              </a:rPr>
+              <a:t>;</a:t>
+            </a:r>
+          </a:p>
+          <a:p>
+            <a:r>
+              <a:rPr lang="en-US" b="0" dirty="0">
+                <a:solidFill>
+                  <a:srgbClr val="000000"/>
+                </a:solidFill>
+                <a:effectLst/>
+                <a:latin typeface="Consolas" panose="020B0609020204030204" pitchFamily="49" charset="0"/>
+              </a:rPr>
+              <a:t>        }</a:t>
+            </a:r>
+          </a:p>
+          <a:p>
+            <a:r>
+              <a:rPr lang="en-US" b="0" dirty="0">
+                <a:solidFill>
+                  <a:srgbClr val="000000"/>
+                </a:solidFill>
+                <a:effectLst/>
+                <a:latin typeface="Consolas" panose="020B0609020204030204" pitchFamily="49" charset="0"/>
+              </a:rPr>
+              <a:t>    }</a:t>
+            </a:r>
+          </a:p>
+          <a:p>
+            <a:br>
+              <a:rPr lang="en-US" b="0" dirty="0">
+                <a:solidFill>
+                  <a:srgbClr val="000000"/>
+                </a:solidFill>
+                <a:effectLst/>
+                <a:latin typeface="Consolas" panose="020B0609020204030204" pitchFamily="49" charset="0"/>
+              </a:rPr>
+            </a:br>
+            <a:r>
+              <a:rPr lang="en-US" b="0" dirty="0">
+                <a:solidFill>
+                  <a:srgbClr val="000000"/>
+                </a:solidFill>
+                <a:effectLst/>
+                <a:latin typeface="Consolas" panose="020B0609020204030204" pitchFamily="49" charset="0"/>
+              </a:rPr>
+              <a:t>    result = </a:t>
+            </a:r>
+            <a:r>
+              <a:rPr lang="en-US" b="0" dirty="0" err="1">
+                <a:solidFill>
+                  <a:srgbClr val="0000FF"/>
+                </a:solidFill>
+                <a:effectLst/>
+                <a:latin typeface="Consolas" panose="020B0609020204030204" pitchFamily="49" charset="0"/>
+              </a:rPr>
+              <a:t>nullptr</a:t>
+            </a:r>
+            <a:r>
+              <a:rPr lang="en-US" b="0" dirty="0">
+                <a:solidFill>
+                  <a:srgbClr val="000000"/>
+                </a:solidFill>
+                <a:effectLst/>
+                <a:latin typeface="Consolas" panose="020B0609020204030204" pitchFamily="49" charset="0"/>
+              </a:rPr>
+              <a:t>;</a:t>
+            </a:r>
+          </a:p>
+          <a:p>
+            <a:r>
+              <a:rPr lang="en-US" b="0" dirty="0">
+                <a:solidFill>
+                  <a:srgbClr val="000000"/>
+                </a:solidFill>
+                <a:effectLst/>
+                <a:latin typeface="Consolas" panose="020B0609020204030204" pitchFamily="49" charset="0"/>
+              </a:rPr>
+              <a:t>}</a:t>
+            </a:r>
+          </a:p>
+        </p:txBody>
+      </p:sp>
+      <p:sp>
+        <p:nvSpPr>
+          <p:cNvPr id="5" name="TextBox 4">
+            <a:extLst>
+              <a:ext uri="{FF2B5EF4-FFF2-40B4-BE49-F238E27FC236}">
+                <a16:creationId xmlns:a16="http://schemas.microsoft.com/office/drawing/2014/main" id="{006351EF-71BA-4B94-9566-07E2FB28D499}"/>
+              </a:ext>
+            </a:extLst>
+          </p:cNvPr>
+          <p:cNvSpPr txBox="1"/>
+          <p:nvPr/>
+        </p:nvSpPr>
+        <p:spPr>
+          <a:xfrm>
+            <a:off x="1079862" y="4498050"/>
+            <a:ext cx="1860381" cy="369332"/>
+          </a:xfrm>
+          <a:prstGeom prst="rect">
+            <a:avLst/>
+          </a:prstGeom>
+          <a:noFill/>
+        </p:spPr>
+        <p:txBody>
+          <a:bodyPr wrap="none" rtlCol="0">
+            <a:spAutoFit/>
+          </a:bodyPr>
+          <a:lstStyle/>
+          <a:p>
+            <a:r>
+              <a:rPr lang="ru-RU" dirty="0"/>
+              <a:t>А можно проще?</a:t>
+            </a:r>
+          </a:p>
+        </p:txBody>
+      </p:sp>
+      <p:sp>
+        <p:nvSpPr>
+          <p:cNvPr id="2" name="TextBox 1">
+            <a:extLst>
+              <a:ext uri="{FF2B5EF4-FFF2-40B4-BE49-F238E27FC236}">
+                <a16:creationId xmlns:a16="http://schemas.microsoft.com/office/drawing/2014/main" id="{9D25C072-B787-B2B3-6B5E-E12FD4ECE3BB}"/>
               </a:ext>
             </a:extLst>
           </p:cNvPr>
@@ -4711,742 +4743,10 @@
           </a:p>
         </p:txBody>
       </p:sp>
-      <p:sp>
-        <p:nvSpPr>
-          <p:cNvPr id="10" name="TextBox 9">
-            <a:extLst>
-              <a:ext uri="{FF2B5EF4-FFF2-40B4-BE49-F238E27FC236}">
-                <a16:creationId xmlns:a16="http://schemas.microsoft.com/office/drawing/2014/main" id="{364C1F3A-6A67-4CC1-8E54-C5EA5C77774D}"/>
-              </a:ext>
-            </a:extLst>
-          </p:cNvPr>
-          <p:cNvSpPr txBox="1"/>
-          <p:nvPr/>
-        </p:nvSpPr>
-        <p:spPr>
-          <a:xfrm>
-            <a:off x="1079862" y="1450056"/>
-            <a:ext cx="8301205" cy="2862322"/>
-          </a:xfrm>
-          <a:prstGeom prst="rect">
-            <a:avLst/>
-          </a:prstGeom>
-          <a:noFill/>
-        </p:spPr>
-        <p:txBody>
-          <a:bodyPr wrap="square">
-            <a:spAutoFit/>
-          </a:bodyPr>
-          <a:lstStyle/>
-          <a:p>
-            <a:r>
-              <a:rPr lang="en-US" b="0" dirty="0">
-                <a:solidFill>
-                  <a:srgbClr val="0000FF"/>
-                </a:solidFill>
-                <a:effectLst/>
-                <a:latin typeface="Consolas" panose="020B0609020204030204" pitchFamily="49" charset="0"/>
-              </a:rPr>
-              <a:t>void</a:t>
-            </a:r>
-            <a:r>
-              <a:rPr lang="en-US" b="0" dirty="0">
-                <a:solidFill>
-                  <a:srgbClr val="000000"/>
-                </a:solidFill>
-                <a:effectLst/>
-                <a:latin typeface="Consolas" panose="020B0609020204030204" pitchFamily="49" charset="0"/>
-              </a:rPr>
-              <a:t> </a:t>
-            </a:r>
-            <a:r>
-              <a:rPr lang="en-US" b="0" dirty="0" err="1">
-                <a:solidFill>
-                  <a:srgbClr val="000000"/>
-                </a:solidFill>
-                <a:effectLst/>
-                <a:latin typeface="Consolas" panose="020B0609020204030204" pitchFamily="49" charset="0"/>
-              </a:rPr>
-              <a:t>linear_search</a:t>
-            </a:r>
-            <a:r>
-              <a:rPr lang="en-US" b="0" dirty="0">
-                <a:solidFill>
-                  <a:srgbClr val="000000"/>
-                </a:solidFill>
-                <a:effectLst/>
-                <a:latin typeface="Consolas" panose="020B0609020204030204" pitchFamily="49" charset="0"/>
-              </a:rPr>
-              <a:t>(vector&lt;</a:t>
-            </a:r>
-            <a:r>
-              <a:rPr lang="en-US" b="0" dirty="0">
-                <a:solidFill>
-                  <a:srgbClr val="0000FF"/>
-                </a:solidFill>
-                <a:effectLst/>
-                <a:latin typeface="Consolas" panose="020B0609020204030204" pitchFamily="49" charset="0"/>
-              </a:rPr>
-              <a:t>int</a:t>
-            </a:r>
-            <a:r>
-              <a:rPr lang="en-US" b="0" dirty="0">
-                <a:solidFill>
-                  <a:srgbClr val="000000"/>
-                </a:solidFill>
-                <a:effectLst/>
-                <a:latin typeface="Consolas" panose="020B0609020204030204" pitchFamily="49" charset="0"/>
-              </a:rPr>
-              <a:t>&gt; &amp;v, </a:t>
-            </a:r>
-            <a:r>
-              <a:rPr lang="en-US" b="0" dirty="0">
-                <a:solidFill>
-                  <a:srgbClr val="0000FF"/>
-                </a:solidFill>
-                <a:effectLst/>
-                <a:latin typeface="Consolas" panose="020B0609020204030204" pitchFamily="49" charset="0"/>
-              </a:rPr>
-              <a:t>int</a:t>
-            </a:r>
-            <a:r>
-              <a:rPr lang="en-US" b="0" dirty="0">
-                <a:solidFill>
-                  <a:srgbClr val="000000"/>
-                </a:solidFill>
-                <a:effectLst/>
-                <a:latin typeface="Consolas" panose="020B0609020204030204" pitchFamily="49" charset="0"/>
-              </a:rPr>
-              <a:t> target, </a:t>
-            </a:r>
-            <a:r>
-              <a:rPr lang="en-US" b="0" dirty="0">
-                <a:solidFill>
-                  <a:srgbClr val="0000FF"/>
-                </a:solidFill>
-                <a:effectLst/>
-                <a:latin typeface="Consolas" panose="020B0609020204030204" pitchFamily="49" charset="0"/>
-              </a:rPr>
-              <a:t>int</a:t>
-            </a:r>
-            <a:r>
-              <a:rPr lang="en-US" b="0" dirty="0">
-                <a:solidFill>
-                  <a:srgbClr val="000000"/>
-                </a:solidFill>
-                <a:effectLst/>
-                <a:latin typeface="Consolas" panose="020B0609020204030204" pitchFamily="49" charset="0"/>
-              </a:rPr>
-              <a:t> *result) {</a:t>
-            </a:r>
-          </a:p>
-          <a:p>
-            <a:r>
-              <a:rPr lang="en-US" b="0" dirty="0">
-                <a:solidFill>
-                  <a:srgbClr val="000000"/>
-                </a:solidFill>
-                <a:effectLst/>
-                <a:latin typeface="Consolas" panose="020B0609020204030204" pitchFamily="49" charset="0"/>
-              </a:rPr>
-              <a:t>    </a:t>
-            </a:r>
-            <a:r>
-              <a:rPr lang="en-US" b="0" dirty="0">
-                <a:solidFill>
-                  <a:srgbClr val="0000FF"/>
-                </a:solidFill>
-                <a:effectLst/>
-                <a:latin typeface="Consolas" panose="020B0609020204030204" pitchFamily="49" charset="0"/>
-              </a:rPr>
-              <a:t>for</a:t>
-            </a:r>
-            <a:r>
-              <a:rPr lang="en-US" b="0" dirty="0">
-                <a:solidFill>
-                  <a:srgbClr val="000000"/>
-                </a:solidFill>
-                <a:effectLst/>
-                <a:latin typeface="Consolas" panose="020B0609020204030204" pitchFamily="49" charset="0"/>
-              </a:rPr>
-              <a:t> (</a:t>
-            </a:r>
-            <a:r>
-              <a:rPr lang="en-US" b="0" dirty="0">
-                <a:solidFill>
-                  <a:srgbClr val="0000FF"/>
-                </a:solidFill>
-                <a:effectLst/>
-                <a:latin typeface="Consolas" panose="020B0609020204030204" pitchFamily="49" charset="0"/>
-              </a:rPr>
-              <a:t>int</a:t>
-            </a:r>
-            <a:r>
-              <a:rPr lang="en-US" b="0" dirty="0">
-                <a:solidFill>
-                  <a:srgbClr val="000000"/>
-                </a:solidFill>
-                <a:effectLst/>
-                <a:latin typeface="Consolas" panose="020B0609020204030204" pitchFamily="49" charset="0"/>
-              </a:rPr>
-              <a:t> </a:t>
-            </a:r>
-            <a:r>
-              <a:rPr lang="en-US" b="0" dirty="0" err="1">
-                <a:solidFill>
-                  <a:srgbClr val="000000"/>
-                </a:solidFill>
-                <a:effectLst/>
-                <a:latin typeface="Consolas" panose="020B0609020204030204" pitchFamily="49" charset="0"/>
-              </a:rPr>
-              <a:t>i</a:t>
-            </a:r>
-            <a:r>
-              <a:rPr lang="en-US" b="0" dirty="0">
-                <a:solidFill>
-                  <a:srgbClr val="000000"/>
-                </a:solidFill>
-                <a:effectLst/>
-                <a:latin typeface="Consolas" panose="020B0609020204030204" pitchFamily="49" charset="0"/>
-              </a:rPr>
-              <a:t> = </a:t>
-            </a:r>
-            <a:r>
-              <a:rPr lang="en-US" b="0" dirty="0">
-                <a:solidFill>
-                  <a:srgbClr val="098658"/>
-                </a:solidFill>
-                <a:effectLst/>
-                <a:latin typeface="Consolas" panose="020B0609020204030204" pitchFamily="49" charset="0"/>
-              </a:rPr>
-              <a:t>0</a:t>
-            </a:r>
-            <a:r>
-              <a:rPr lang="en-US" b="0" dirty="0">
-                <a:solidFill>
-                  <a:srgbClr val="000000"/>
-                </a:solidFill>
-                <a:effectLst/>
-                <a:latin typeface="Consolas" panose="020B0609020204030204" pitchFamily="49" charset="0"/>
-              </a:rPr>
-              <a:t>; </a:t>
-            </a:r>
-            <a:r>
-              <a:rPr lang="en-US" b="0" dirty="0" err="1">
-                <a:solidFill>
-                  <a:srgbClr val="000000"/>
-                </a:solidFill>
-                <a:effectLst/>
-                <a:latin typeface="Consolas" panose="020B0609020204030204" pitchFamily="49" charset="0"/>
-              </a:rPr>
-              <a:t>i</a:t>
-            </a:r>
-            <a:r>
-              <a:rPr lang="en-US" b="0" dirty="0">
-                <a:solidFill>
-                  <a:srgbClr val="000000"/>
-                </a:solidFill>
-                <a:effectLst/>
-                <a:latin typeface="Consolas" panose="020B0609020204030204" pitchFamily="49" charset="0"/>
-              </a:rPr>
-              <a:t> &lt; </a:t>
-            </a:r>
-            <a:r>
-              <a:rPr lang="en-US" b="0" dirty="0" err="1">
-                <a:solidFill>
-                  <a:srgbClr val="000000"/>
-                </a:solidFill>
-                <a:effectLst/>
-                <a:latin typeface="Consolas" panose="020B0609020204030204" pitchFamily="49" charset="0"/>
-              </a:rPr>
-              <a:t>v.size</a:t>
-            </a:r>
-            <a:r>
-              <a:rPr lang="en-US" b="0" dirty="0">
-                <a:solidFill>
-                  <a:srgbClr val="000000"/>
-                </a:solidFill>
-                <a:effectLst/>
-                <a:latin typeface="Consolas" panose="020B0609020204030204" pitchFamily="49" charset="0"/>
-              </a:rPr>
-              <a:t>(); ++</a:t>
-            </a:r>
-            <a:r>
-              <a:rPr lang="en-US" b="0" dirty="0" err="1">
-                <a:solidFill>
-                  <a:srgbClr val="000000"/>
-                </a:solidFill>
-                <a:effectLst/>
-                <a:latin typeface="Consolas" panose="020B0609020204030204" pitchFamily="49" charset="0"/>
-              </a:rPr>
-              <a:t>i</a:t>
-            </a:r>
-            <a:r>
-              <a:rPr lang="en-US" b="0" dirty="0">
-                <a:solidFill>
-                  <a:srgbClr val="000000"/>
-                </a:solidFill>
-                <a:effectLst/>
-                <a:latin typeface="Consolas" panose="020B0609020204030204" pitchFamily="49" charset="0"/>
-              </a:rPr>
-              <a:t>) {</a:t>
-            </a:r>
-          </a:p>
-          <a:p>
-            <a:r>
-              <a:rPr lang="en-US" b="0" dirty="0">
-                <a:solidFill>
-                  <a:srgbClr val="000000"/>
-                </a:solidFill>
-                <a:effectLst/>
-                <a:latin typeface="Consolas" panose="020B0609020204030204" pitchFamily="49" charset="0"/>
-              </a:rPr>
-              <a:t>        </a:t>
-            </a:r>
-            <a:r>
-              <a:rPr lang="en-US" b="0" dirty="0">
-                <a:solidFill>
-                  <a:srgbClr val="0000FF"/>
-                </a:solidFill>
-                <a:effectLst/>
-                <a:latin typeface="Consolas" panose="020B0609020204030204" pitchFamily="49" charset="0"/>
-              </a:rPr>
-              <a:t>if</a:t>
-            </a:r>
-            <a:r>
-              <a:rPr lang="en-US" b="0" dirty="0">
-                <a:solidFill>
-                  <a:srgbClr val="000000"/>
-                </a:solidFill>
-                <a:effectLst/>
-                <a:latin typeface="Consolas" panose="020B0609020204030204" pitchFamily="49" charset="0"/>
-              </a:rPr>
-              <a:t> (target == v[</a:t>
-            </a:r>
-            <a:r>
-              <a:rPr lang="en-US" b="0" dirty="0" err="1">
-                <a:solidFill>
-                  <a:srgbClr val="000000"/>
-                </a:solidFill>
-                <a:effectLst/>
-                <a:latin typeface="Consolas" panose="020B0609020204030204" pitchFamily="49" charset="0"/>
-              </a:rPr>
-              <a:t>i</a:t>
-            </a:r>
-            <a:r>
-              <a:rPr lang="en-US" b="0" dirty="0">
-                <a:solidFill>
-                  <a:srgbClr val="000000"/>
-                </a:solidFill>
-                <a:effectLst/>
-                <a:latin typeface="Consolas" panose="020B0609020204030204" pitchFamily="49" charset="0"/>
-              </a:rPr>
-              <a:t>]) {</a:t>
-            </a:r>
-          </a:p>
-          <a:p>
-            <a:r>
-              <a:rPr lang="en-US" b="0" dirty="0">
-                <a:solidFill>
-                  <a:srgbClr val="000000"/>
-                </a:solidFill>
-                <a:effectLst/>
-                <a:latin typeface="Consolas" panose="020B0609020204030204" pitchFamily="49" charset="0"/>
-              </a:rPr>
-              <a:t>            *result = </a:t>
-            </a:r>
-            <a:r>
-              <a:rPr lang="en-US" b="0" dirty="0" err="1">
-                <a:solidFill>
-                  <a:srgbClr val="000000"/>
-                </a:solidFill>
-                <a:effectLst/>
-                <a:latin typeface="Consolas" panose="020B0609020204030204" pitchFamily="49" charset="0"/>
-              </a:rPr>
-              <a:t>i</a:t>
-            </a:r>
-            <a:r>
-              <a:rPr lang="en-US" b="0" dirty="0">
-                <a:solidFill>
-                  <a:srgbClr val="000000"/>
-                </a:solidFill>
-                <a:effectLst/>
-                <a:latin typeface="Consolas" panose="020B0609020204030204" pitchFamily="49" charset="0"/>
-              </a:rPr>
-              <a:t>;</a:t>
-            </a:r>
-          </a:p>
-          <a:p>
-            <a:r>
-              <a:rPr lang="en-US" b="0" dirty="0">
-                <a:solidFill>
-                  <a:srgbClr val="000000"/>
-                </a:solidFill>
-                <a:effectLst/>
-                <a:latin typeface="Consolas" panose="020B0609020204030204" pitchFamily="49" charset="0"/>
-              </a:rPr>
-              <a:t>            </a:t>
-            </a:r>
-            <a:r>
-              <a:rPr lang="en-US" b="0" dirty="0">
-                <a:solidFill>
-                  <a:srgbClr val="0000FF"/>
-                </a:solidFill>
-                <a:effectLst/>
-                <a:latin typeface="Consolas" panose="020B0609020204030204" pitchFamily="49" charset="0"/>
-              </a:rPr>
-              <a:t>return</a:t>
-            </a:r>
-            <a:r>
-              <a:rPr lang="en-US" b="0" dirty="0">
-                <a:solidFill>
-                  <a:srgbClr val="000000"/>
-                </a:solidFill>
-                <a:effectLst/>
-                <a:latin typeface="Consolas" panose="020B0609020204030204" pitchFamily="49" charset="0"/>
-              </a:rPr>
-              <a:t>;</a:t>
-            </a:r>
-          </a:p>
-          <a:p>
-            <a:r>
-              <a:rPr lang="en-US" b="0" dirty="0">
-                <a:solidFill>
-                  <a:srgbClr val="000000"/>
-                </a:solidFill>
-                <a:effectLst/>
-                <a:latin typeface="Consolas" panose="020B0609020204030204" pitchFamily="49" charset="0"/>
-              </a:rPr>
-              <a:t>        }</a:t>
-            </a:r>
-          </a:p>
-          <a:p>
-            <a:r>
-              <a:rPr lang="en-US" b="0" dirty="0">
-                <a:solidFill>
-                  <a:srgbClr val="000000"/>
-                </a:solidFill>
-                <a:effectLst/>
-                <a:latin typeface="Consolas" panose="020B0609020204030204" pitchFamily="49" charset="0"/>
-              </a:rPr>
-              <a:t>    }</a:t>
-            </a:r>
-          </a:p>
-          <a:p>
-            <a:br>
-              <a:rPr lang="en-US" b="0" dirty="0">
-                <a:solidFill>
-                  <a:srgbClr val="000000"/>
-                </a:solidFill>
-                <a:effectLst/>
-                <a:latin typeface="Consolas" panose="020B0609020204030204" pitchFamily="49" charset="0"/>
-              </a:rPr>
-            </a:br>
-            <a:r>
-              <a:rPr lang="en-US" b="0" dirty="0">
-                <a:solidFill>
-                  <a:srgbClr val="000000"/>
-                </a:solidFill>
-                <a:effectLst/>
-                <a:latin typeface="Consolas" panose="020B0609020204030204" pitchFamily="49" charset="0"/>
-              </a:rPr>
-              <a:t>    result = </a:t>
-            </a:r>
-            <a:r>
-              <a:rPr lang="en-US" b="0" dirty="0" err="1">
-                <a:solidFill>
-                  <a:srgbClr val="0000FF"/>
-                </a:solidFill>
-                <a:effectLst/>
-                <a:latin typeface="Consolas" panose="020B0609020204030204" pitchFamily="49" charset="0"/>
-              </a:rPr>
-              <a:t>nullptr</a:t>
-            </a:r>
-            <a:r>
-              <a:rPr lang="en-US" b="0" dirty="0">
-                <a:solidFill>
-                  <a:srgbClr val="000000"/>
-                </a:solidFill>
-                <a:effectLst/>
-                <a:latin typeface="Consolas" panose="020B0609020204030204" pitchFamily="49" charset="0"/>
-              </a:rPr>
-              <a:t>;</a:t>
-            </a:r>
-          </a:p>
-          <a:p>
-            <a:r>
-              <a:rPr lang="en-US" b="0" dirty="0">
-                <a:solidFill>
-                  <a:srgbClr val="000000"/>
-                </a:solidFill>
-                <a:effectLst/>
-                <a:latin typeface="Consolas" panose="020B0609020204030204" pitchFamily="49" charset="0"/>
-              </a:rPr>
-              <a:t>}</a:t>
-            </a:r>
-          </a:p>
-        </p:txBody>
-      </p:sp>
-      <p:sp>
-        <p:nvSpPr>
-          <p:cNvPr id="11" name="TextBox 10">
-            <a:extLst>
-              <a:ext uri="{FF2B5EF4-FFF2-40B4-BE49-F238E27FC236}">
-                <a16:creationId xmlns:a16="http://schemas.microsoft.com/office/drawing/2014/main" id="{BF732F0C-1B8A-4D97-A2A4-F49F883DA873}"/>
-              </a:ext>
-            </a:extLst>
-          </p:cNvPr>
-          <p:cNvSpPr txBox="1"/>
-          <p:nvPr/>
-        </p:nvSpPr>
-        <p:spPr>
-          <a:xfrm>
-            <a:off x="1079862" y="4530781"/>
-            <a:ext cx="6309360" cy="1754326"/>
-          </a:xfrm>
-          <a:prstGeom prst="rect">
-            <a:avLst/>
-          </a:prstGeom>
-          <a:noFill/>
-        </p:spPr>
-        <p:txBody>
-          <a:bodyPr wrap="square">
-            <a:spAutoFit/>
-          </a:bodyPr>
-          <a:lstStyle/>
-          <a:p>
-            <a:r>
-              <a:rPr lang="en-US" b="0" dirty="0">
-                <a:solidFill>
-                  <a:srgbClr val="0000FF"/>
-                </a:solidFill>
-                <a:effectLst/>
-                <a:latin typeface="Consolas" panose="020B0609020204030204" pitchFamily="49" charset="0"/>
-              </a:rPr>
-              <a:t>void</a:t>
-            </a:r>
-            <a:r>
-              <a:rPr lang="en-US" b="0" dirty="0">
-                <a:solidFill>
-                  <a:srgbClr val="000000"/>
-                </a:solidFill>
-                <a:effectLst/>
-                <a:latin typeface="Consolas" panose="020B0609020204030204" pitchFamily="49" charset="0"/>
-              </a:rPr>
-              <a:t> </a:t>
-            </a:r>
-            <a:r>
-              <a:rPr lang="en-US" b="0" dirty="0" err="1">
-                <a:solidFill>
-                  <a:srgbClr val="000000"/>
-                </a:solidFill>
-                <a:effectLst/>
-                <a:latin typeface="Consolas" panose="020B0609020204030204" pitchFamily="49" charset="0"/>
-              </a:rPr>
-              <a:t>linear_search</a:t>
-            </a:r>
-            <a:r>
-              <a:rPr lang="en-US" b="0" dirty="0">
-                <a:solidFill>
-                  <a:srgbClr val="000000"/>
-                </a:solidFill>
-                <a:effectLst/>
-                <a:latin typeface="Consolas" panose="020B0609020204030204" pitchFamily="49" charset="0"/>
-              </a:rPr>
-              <a:t>(vector&lt;</a:t>
-            </a:r>
-            <a:r>
-              <a:rPr lang="en-US" b="0" dirty="0">
-                <a:solidFill>
-                  <a:srgbClr val="0000FF"/>
-                </a:solidFill>
-                <a:effectLst/>
-                <a:latin typeface="Consolas" panose="020B0609020204030204" pitchFamily="49" charset="0"/>
-              </a:rPr>
-              <a:t>int</a:t>
-            </a:r>
-            <a:r>
-              <a:rPr lang="en-US" b="0" dirty="0">
-                <a:solidFill>
-                  <a:srgbClr val="000000"/>
-                </a:solidFill>
-                <a:effectLst/>
-                <a:latin typeface="Consolas" panose="020B0609020204030204" pitchFamily="49" charset="0"/>
-              </a:rPr>
-              <a:t>&gt; &amp;v, </a:t>
-            </a:r>
-            <a:r>
-              <a:rPr lang="en-US" b="0" dirty="0">
-                <a:solidFill>
-                  <a:srgbClr val="0000FF"/>
-                </a:solidFill>
-                <a:effectLst/>
-                <a:latin typeface="Consolas" panose="020B0609020204030204" pitchFamily="49" charset="0"/>
-              </a:rPr>
-              <a:t>int</a:t>
-            </a:r>
-            <a:r>
-              <a:rPr lang="en-US" b="0" dirty="0">
-                <a:solidFill>
-                  <a:srgbClr val="000000"/>
-                </a:solidFill>
-                <a:effectLst/>
-                <a:latin typeface="Consolas" panose="020B0609020204030204" pitchFamily="49" charset="0"/>
-              </a:rPr>
-              <a:t> target, </a:t>
-            </a:r>
-            <a:r>
-              <a:rPr lang="en-US" b="0" dirty="0">
-                <a:solidFill>
-                  <a:srgbClr val="0000FF"/>
-                </a:solidFill>
-                <a:effectLst/>
-                <a:latin typeface="Consolas" panose="020B0609020204030204" pitchFamily="49" charset="0"/>
-              </a:rPr>
-              <a:t>int</a:t>
-            </a:r>
-            <a:r>
-              <a:rPr lang="en-US" b="0" dirty="0">
-                <a:solidFill>
-                  <a:srgbClr val="000000"/>
-                </a:solidFill>
-                <a:effectLst/>
-                <a:latin typeface="Consolas" panose="020B0609020204030204" pitchFamily="49" charset="0"/>
-              </a:rPr>
-              <a:t> * result) {</a:t>
-            </a:r>
-          </a:p>
-          <a:p>
-            <a:r>
-              <a:rPr lang="en-US" b="0" dirty="0">
-                <a:solidFill>
-                  <a:srgbClr val="000000"/>
-                </a:solidFill>
-                <a:effectLst/>
-                <a:latin typeface="Consolas" panose="020B0609020204030204" pitchFamily="49" charset="0"/>
-              </a:rPr>
-              <a:t>    </a:t>
-            </a:r>
-            <a:r>
-              <a:rPr lang="en-US" b="0" dirty="0">
-                <a:solidFill>
-                  <a:srgbClr val="0000FF"/>
-                </a:solidFill>
-                <a:effectLst/>
-                <a:latin typeface="Consolas" panose="020B0609020204030204" pitchFamily="49" charset="0"/>
-              </a:rPr>
-              <a:t>auto</a:t>
-            </a:r>
-            <a:r>
-              <a:rPr lang="en-US" b="0" dirty="0">
-                <a:solidFill>
-                  <a:srgbClr val="000000"/>
-                </a:solidFill>
-                <a:effectLst/>
-                <a:latin typeface="Consolas" panose="020B0609020204030204" pitchFamily="49" charset="0"/>
-              </a:rPr>
-              <a:t> it = find(</a:t>
-            </a:r>
-            <a:r>
-              <a:rPr lang="en-US" b="0" dirty="0" err="1">
-                <a:solidFill>
-                  <a:srgbClr val="000000"/>
-                </a:solidFill>
-                <a:effectLst/>
-                <a:latin typeface="Consolas" panose="020B0609020204030204" pitchFamily="49" charset="0"/>
-              </a:rPr>
-              <a:t>v.begin</a:t>
-            </a:r>
-            <a:r>
-              <a:rPr lang="en-US" b="0" dirty="0">
-                <a:solidFill>
-                  <a:srgbClr val="000000"/>
-                </a:solidFill>
-                <a:effectLst/>
-                <a:latin typeface="Consolas" panose="020B0609020204030204" pitchFamily="49" charset="0"/>
-              </a:rPr>
-              <a:t>(), </a:t>
-            </a:r>
-            <a:r>
-              <a:rPr lang="en-US" b="0" dirty="0" err="1">
-                <a:solidFill>
-                  <a:srgbClr val="000000"/>
-                </a:solidFill>
-                <a:effectLst/>
-                <a:latin typeface="Consolas" panose="020B0609020204030204" pitchFamily="49" charset="0"/>
-              </a:rPr>
-              <a:t>v.end</a:t>
-            </a:r>
-            <a:r>
-              <a:rPr lang="en-US" b="0" dirty="0">
-                <a:solidFill>
-                  <a:srgbClr val="000000"/>
-                </a:solidFill>
-                <a:effectLst/>
-                <a:latin typeface="Consolas" panose="020B0609020204030204" pitchFamily="49" charset="0"/>
-              </a:rPr>
-              <a:t>(), target);</a:t>
-            </a:r>
-          </a:p>
-          <a:p>
-            <a:br>
-              <a:rPr lang="en-US" b="0" dirty="0">
-                <a:solidFill>
-                  <a:srgbClr val="000000"/>
-                </a:solidFill>
-                <a:effectLst/>
-                <a:latin typeface="Consolas" panose="020B0609020204030204" pitchFamily="49" charset="0"/>
-              </a:rPr>
-            </a:br>
-            <a:r>
-              <a:rPr lang="en-US" b="0" dirty="0">
-                <a:solidFill>
-                  <a:srgbClr val="000000"/>
-                </a:solidFill>
-                <a:effectLst/>
-                <a:latin typeface="Consolas" panose="020B0609020204030204" pitchFamily="49" charset="0"/>
-              </a:rPr>
-              <a:t>    *result = it - </a:t>
-            </a:r>
-            <a:r>
-              <a:rPr lang="en-US" b="0" dirty="0" err="1">
-                <a:solidFill>
-                  <a:srgbClr val="000000"/>
-                </a:solidFill>
-                <a:effectLst/>
-                <a:latin typeface="Consolas" panose="020B0609020204030204" pitchFamily="49" charset="0"/>
-              </a:rPr>
-              <a:t>v.begin</a:t>
-            </a:r>
-            <a:r>
-              <a:rPr lang="en-US" b="0" dirty="0">
-                <a:solidFill>
-                  <a:srgbClr val="000000"/>
-                </a:solidFill>
-                <a:effectLst/>
-                <a:latin typeface="Consolas" panose="020B0609020204030204" pitchFamily="49" charset="0"/>
-              </a:rPr>
-              <a:t>();</a:t>
-            </a:r>
-          </a:p>
-          <a:p>
-            <a:r>
-              <a:rPr lang="en-US" b="0" dirty="0">
-                <a:solidFill>
-                  <a:srgbClr val="000000"/>
-                </a:solidFill>
-                <a:effectLst/>
-                <a:latin typeface="Consolas" panose="020B0609020204030204" pitchFamily="49" charset="0"/>
-              </a:rPr>
-              <a:t>}</a:t>
-            </a:r>
-          </a:p>
-        </p:txBody>
-      </p:sp>
     </p:spTree>
     <p:extLst>
       <p:ext uri="{BB962C8B-B14F-4D97-AF65-F5344CB8AC3E}">
-        <p14:creationId xmlns:p14="http://schemas.microsoft.com/office/powerpoint/2010/main" val="4102383082"/>
+        <p14:creationId xmlns:p14="http://schemas.microsoft.com/office/powerpoint/2010/main" val="36929741"/>
       </p:ext>
     </p:extLst>
   </p:cSld>
@@ -5544,7 +4844,7 @@
         <p:spPr>
           <a:xfrm>
             <a:off x="975360" y="427507"/>
-            <a:ext cx="4861972" cy="1107996"/>
+            <a:ext cx="4792146" cy="1107996"/>
           </a:xfrm>
           <a:prstGeom prst="rect">
             <a:avLst/>
@@ -5559,7 +4859,7 @@
           <a:p>
             <a:r>
               <a:rPr lang="en-US" sz="6600" dirty="0"/>
-              <a:t>Binary Search</a:t>
+              <a:t>Linear Search</a:t>
             </a:r>
             <a:endParaRPr lang="ru-RU" sz="6600" dirty="0"/>
           </a:p>
@@ -5604,10 +4904,10 @@
       </p:cxnSp>
       <p:sp>
         <p:nvSpPr>
-          <p:cNvPr id="2" name="TextBox 1">
-            <a:extLst>
-              <a:ext uri="{FF2B5EF4-FFF2-40B4-BE49-F238E27FC236}">
-                <a16:creationId xmlns:a16="http://schemas.microsoft.com/office/drawing/2014/main" id="{B2F2FDE6-48A9-49D9-954C-06C9D888A093}"/>
+          <p:cNvPr id="23" name="TextBox 22">
+            <a:extLst>
+              <a:ext uri="{FF2B5EF4-FFF2-40B4-BE49-F238E27FC236}">
+                <a16:creationId xmlns:a16="http://schemas.microsoft.com/office/drawing/2014/main" id="{AAA2DEAF-02AF-4D90-B5DC-759F7B2809C8}"/>
               </a:ext>
             </a:extLst>
           </p:cNvPr>
@@ -5616,8 +4916,8 @@
         </p:nvSpPr>
         <p:spPr>
           <a:xfrm>
-            <a:off x="975360" y="1535503"/>
-            <a:ext cx="9347200" cy="2677656"/>
+            <a:off x="10458815" y="6152152"/>
+            <a:ext cx="1274773" cy="369332"/>
           </a:xfrm>
           <a:prstGeom prst="rect">
             <a:avLst/>
@@ -5625,6 +4925,948 @@
           <a:noFill/>
         </p:spPr>
         <p:txBody>
+          <a:bodyPr wrap="none" rtlCol="0">
+            <a:spAutoFit/>
+          </a:bodyPr>
+          <a:lstStyle/>
+          <a:p>
+            <a:r>
+              <a:rPr lang="en-US" dirty="0">
+                <a:solidFill>
+                  <a:schemeClr val="accent2"/>
+                </a:solidFill>
+                <a:hlinkClick r:id="rId2">
+                  <a:extLst>
+                    <a:ext uri="{A12FA001-AC4F-418D-AE19-62706E023703}">
+                      <ahyp:hlinkClr xmlns:ahyp="http://schemas.microsoft.com/office/drawing/2018/hyperlinkcolor" val="tx"/>
+                    </a:ext>
+                  </a:extLst>
+                </a:hlinkClick>
+              </a:rPr>
+              <a:t>godbolt.org</a:t>
+            </a:r>
+            <a:endParaRPr lang="ru-RU" dirty="0">
+              <a:solidFill>
+                <a:schemeClr val="accent2"/>
+              </a:solidFill>
+            </a:endParaRPr>
+          </a:p>
+        </p:txBody>
+      </p:sp>
+      <p:sp>
+        <p:nvSpPr>
+          <p:cNvPr id="10" name="TextBox 9">
+            <a:extLst>
+              <a:ext uri="{FF2B5EF4-FFF2-40B4-BE49-F238E27FC236}">
+                <a16:creationId xmlns:a16="http://schemas.microsoft.com/office/drawing/2014/main" id="{364C1F3A-6A67-4CC1-8E54-C5EA5C77774D}"/>
+              </a:ext>
+            </a:extLst>
+          </p:cNvPr>
+          <p:cNvSpPr txBox="1"/>
+          <p:nvPr/>
+        </p:nvSpPr>
+        <p:spPr>
+          <a:xfrm>
+            <a:off x="1079862" y="1450056"/>
+            <a:ext cx="8301205" cy="2862322"/>
+          </a:xfrm>
+          <a:prstGeom prst="rect">
+            <a:avLst/>
+          </a:prstGeom>
+          <a:noFill/>
+        </p:spPr>
+        <p:txBody>
+          <a:bodyPr wrap="square">
+            <a:spAutoFit/>
+          </a:bodyPr>
+          <a:lstStyle/>
+          <a:p>
+            <a:r>
+              <a:rPr lang="en-US" b="0" dirty="0">
+                <a:solidFill>
+                  <a:srgbClr val="0000FF"/>
+                </a:solidFill>
+                <a:effectLst/>
+                <a:latin typeface="Consolas" panose="020B0609020204030204" pitchFamily="49" charset="0"/>
+              </a:rPr>
+              <a:t>void</a:t>
+            </a:r>
+            <a:r>
+              <a:rPr lang="en-US" b="0" dirty="0">
+                <a:solidFill>
+                  <a:srgbClr val="000000"/>
+                </a:solidFill>
+                <a:effectLst/>
+                <a:latin typeface="Consolas" panose="020B0609020204030204" pitchFamily="49" charset="0"/>
+              </a:rPr>
+              <a:t> </a:t>
+            </a:r>
+            <a:r>
+              <a:rPr lang="en-US" b="0" dirty="0" err="1">
+                <a:solidFill>
+                  <a:srgbClr val="000000"/>
+                </a:solidFill>
+                <a:effectLst/>
+                <a:latin typeface="Consolas" panose="020B0609020204030204" pitchFamily="49" charset="0"/>
+              </a:rPr>
+              <a:t>linear_search</a:t>
+            </a:r>
+            <a:r>
+              <a:rPr lang="en-US" b="0" dirty="0">
+                <a:solidFill>
+                  <a:srgbClr val="000000"/>
+                </a:solidFill>
+                <a:effectLst/>
+                <a:latin typeface="Consolas" panose="020B0609020204030204" pitchFamily="49" charset="0"/>
+              </a:rPr>
+              <a:t>(vector&lt;</a:t>
+            </a:r>
+            <a:r>
+              <a:rPr lang="en-US" b="0" dirty="0">
+                <a:solidFill>
+                  <a:srgbClr val="0000FF"/>
+                </a:solidFill>
+                <a:effectLst/>
+                <a:latin typeface="Consolas" panose="020B0609020204030204" pitchFamily="49" charset="0"/>
+              </a:rPr>
+              <a:t>int</a:t>
+            </a:r>
+            <a:r>
+              <a:rPr lang="en-US" b="0" dirty="0">
+                <a:solidFill>
+                  <a:srgbClr val="000000"/>
+                </a:solidFill>
+                <a:effectLst/>
+                <a:latin typeface="Consolas" panose="020B0609020204030204" pitchFamily="49" charset="0"/>
+              </a:rPr>
+              <a:t>&gt; &amp;v, </a:t>
+            </a:r>
+            <a:r>
+              <a:rPr lang="en-US" b="0" dirty="0">
+                <a:solidFill>
+                  <a:srgbClr val="0000FF"/>
+                </a:solidFill>
+                <a:effectLst/>
+                <a:latin typeface="Consolas" panose="020B0609020204030204" pitchFamily="49" charset="0"/>
+              </a:rPr>
+              <a:t>int</a:t>
+            </a:r>
+            <a:r>
+              <a:rPr lang="en-US" b="0" dirty="0">
+                <a:solidFill>
+                  <a:srgbClr val="000000"/>
+                </a:solidFill>
+                <a:effectLst/>
+                <a:latin typeface="Consolas" panose="020B0609020204030204" pitchFamily="49" charset="0"/>
+              </a:rPr>
+              <a:t> target, </a:t>
+            </a:r>
+            <a:r>
+              <a:rPr lang="en-US" b="0" dirty="0">
+                <a:solidFill>
+                  <a:srgbClr val="0000FF"/>
+                </a:solidFill>
+                <a:effectLst/>
+                <a:latin typeface="Consolas" panose="020B0609020204030204" pitchFamily="49" charset="0"/>
+              </a:rPr>
+              <a:t>int</a:t>
+            </a:r>
+            <a:r>
+              <a:rPr lang="en-US" b="0" dirty="0">
+                <a:solidFill>
+                  <a:srgbClr val="000000"/>
+                </a:solidFill>
+                <a:effectLst/>
+                <a:latin typeface="Consolas" panose="020B0609020204030204" pitchFamily="49" charset="0"/>
+              </a:rPr>
+              <a:t> *result) {</a:t>
+            </a:r>
+          </a:p>
+          <a:p>
+            <a:r>
+              <a:rPr lang="en-US" b="0" dirty="0">
+                <a:solidFill>
+                  <a:srgbClr val="000000"/>
+                </a:solidFill>
+                <a:effectLst/>
+                <a:latin typeface="Consolas" panose="020B0609020204030204" pitchFamily="49" charset="0"/>
+              </a:rPr>
+              <a:t>    </a:t>
+            </a:r>
+            <a:r>
+              <a:rPr lang="en-US" b="0" dirty="0">
+                <a:solidFill>
+                  <a:srgbClr val="0000FF"/>
+                </a:solidFill>
+                <a:effectLst/>
+                <a:latin typeface="Consolas" panose="020B0609020204030204" pitchFamily="49" charset="0"/>
+              </a:rPr>
+              <a:t>for</a:t>
+            </a:r>
+            <a:r>
+              <a:rPr lang="en-US" b="0" dirty="0">
+                <a:solidFill>
+                  <a:srgbClr val="000000"/>
+                </a:solidFill>
+                <a:effectLst/>
+                <a:latin typeface="Consolas" panose="020B0609020204030204" pitchFamily="49" charset="0"/>
+              </a:rPr>
+              <a:t> (</a:t>
+            </a:r>
+            <a:r>
+              <a:rPr lang="en-US" b="0" dirty="0">
+                <a:solidFill>
+                  <a:srgbClr val="0000FF"/>
+                </a:solidFill>
+                <a:effectLst/>
+                <a:latin typeface="Consolas" panose="020B0609020204030204" pitchFamily="49" charset="0"/>
+              </a:rPr>
+              <a:t>int</a:t>
+            </a:r>
+            <a:r>
+              <a:rPr lang="en-US" b="0" dirty="0">
+                <a:solidFill>
+                  <a:srgbClr val="000000"/>
+                </a:solidFill>
+                <a:effectLst/>
+                <a:latin typeface="Consolas" panose="020B0609020204030204" pitchFamily="49" charset="0"/>
+              </a:rPr>
+              <a:t> </a:t>
+            </a:r>
+            <a:r>
+              <a:rPr lang="en-US" b="0" dirty="0" err="1">
+                <a:solidFill>
+                  <a:srgbClr val="000000"/>
+                </a:solidFill>
+                <a:effectLst/>
+                <a:latin typeface="Consolas" panose="020B0609020204030204" pitchFamily="49" charset="0"/>
+              </a:rPr>
+              <a:t>i</a:t>
+            </a:r>
+            <a:r>
+              <a:rPr lang="en-US" b="0" dirty="0">
+                <a:solidFill>
+                  <a:srgbClr val="000000"/>
+                </a:solidFill>
+                <a:effectLst/>
+                <a:latin typeface="Consolas" panose="020B0609020204030204" pitchFamily="49" charset="0"/>
+              </a:rPr>
+              <a:t> = </a:t>
+            </a:r>
+            <a:r>
+              <a:rPr lang="en-US" b="0" dirty="0">
+                <a:solidFill>
+                  <a:srgbClr val="098658"/>
+                </a:solidFill>
+                <a:effectLst/>
+                <a:latin typeface="Consolas" panose="020B0609020204030204" pitchFamily="49" charset="0"/>
+              </a:rPr>
+              <a:t>0</a:t>
+            </a:r>
+            <a:r>
+              <a:rPr lang="en-US" b="0" dirty="0">
+                <a:solidFill>
+                  <a:srgbClr val="000000"/>
+                </a:solidFill>
+                <a:effectLst/>
+                <a:latin typeface="Consolas" panose="020B0609020204030204" pitchFamily="49" charset="0"/>
+              </a:rPr>
+              <a:t>; </a:t>
+            </a:r>
+            <a:r>
+              <a:rPr lang="en-US" b="0" dirty="0" err="1">
+                <a:solidFill>
+                  <a:srgbClr val="000000"/>
+                </a:solidFill>
+                <a:effectLst/>
+                <a:latin typeface="Consolas" panose="020B0609020204030204" pitchFamily="49" charset="0"/>
+              </a:rPr>
+              <a:t>i</a:t>
+            </a:r>
+            <a:r>
+              <a:rPr lang="en-US" b="0" dirty="0">
+                <a:solidFill>
+                  <a:srgbClr val="000000"/>
+                </a:solidFill>
+                <a:effectLst/>
+                <a:latin typeface="Consolas" panose="020B0609020204030204" pitchFamily="49" charset="0"/>
+              </a:rPr>
+              <a:t> &lt; </a:t>
+            </a:r>
+            <a:r>
+              <a:rPr lang="en-US" b="0" dirty="0" err="1">
+                <a:solidFill>
+                  <a:srgbClr val="000000"/>
+                </a:solidFill>
+                <a:effectLst/>
+                <a:latin typeface="Consolas" panose="020B0609020204030204" pitchFamily="49" charset="0"/>
+              </a:rPr>
+              <a:t>v.size</a:t>
+            </a:r>
+            <a:r>
+              <a:rPr lang="en-US" b="0" dirty="0">
+                <a:solidFill>
+                  <a:srgbClr val="000000"/>
+                </a:solidFill>
+                <a:effectLst/>
+                <a:latin typeface="Consolas" panose="020B0609020204030204" pitchFamily="49" charset="0"/>
+              </a:rPr>
+              <a:t>(); ++</a:t>
+            </a:r>
+            <a:r>
+              <a:rPr lang="en-US" b="0" dirty="0" err="1">
+                <a:solidFill>
+                  <a:srgbClr val="000000"/>
+                </a:solidFill>
+                <a:effectLst/>
+                <a:latin typeface="Consolas" panose="020B0609020204030204" pitchFamily="49" charset="0"/>
+              </a:rPr>
+              <a:t>i</a:t>
+            </a:r>
+            <a:r>
+              <a:rPr lang="en-US" b="0" dirty="0">
+                <a:solidFill>
+                  <a:srgbClr val="000000"/>
+                </a:solidFill>
+                <a:effectLst/>
+                <a:latin typeface="Consolas" panose="020B0609020204030204" pitchFamily="49" charset="0"/>
+              </a:rPr>
+              <a:t>) {</a:t>
+            </a:r>
+          </a:p>
+          <a:p>
+            <a:r>
+              <a:rPr lang="en-US" b="0" dirty="0">
+                <a:solidFill>
+                  <a:srgbClr val="000000"/>
+                </a:solidFill>
+                <a:effectLst/>
+                <a:latin typeface="Consolas" panose="020B0609020204030204" pitchFamily="49" charset="0"/>
+              </a:rPr>
+              <a:t>        </a:t>
+            </a:r>
+            <a:r>
+              <a:rPr lang="en-US" b="0" dirty="0">
+                <a:solidFill>
+                  <a:srgbClr val="0000FF"/>
+                </a:solidFill>
+                <a:effectLst/>
+                <a:latin typeface="Consolas" panose="020B0609020204030204" pitchFamily="49" charset="0"/>
+              </a:rPr>
+              <a:t>if</a:t>
+            </a:r>
+            <a:r>
+              <a:rPr lang="en-US" b="0" dirty="0">
+                <a:solidFill>
+                  <a:srgbClr val="000000"/>
+                </a:solidFill>
+                <a:effectLst/>
+                <a:latin typeface="Consolas" panose="020B0609020204030204" pitchFamily="49" charset="0"/>
+              </a:rPr>
+              <a:t> (target == v[</a:t>
+            </a:r>
+            <a:r>
+              <a:rPr lang="en-US" b="0" dirty="0" err="1">
+                <a:solidFill>
+                  <a:srgbClr val="000000"/>
+                </a:solidFill>
+                <a:effectLst/>
+                <a:latin typeface="Consolas" panose="020B0609020204030204" pitchFamily="49" charset="0"/>
+              </a:rPr>
+              <a:t>i</a:t>
+            </a:r>
+            <a:r>
+              <a:rPr lang="en-US" b="0" dirty="0">
+                <a:solidFill>
+                  <a:srgbClr val="000000"/>
+                </a:solidFill>
+                <a:effectLst/>
+                <a:latin typeface="Consolas" panose="020B0609020204030204" pitchFamily="49" charset="0"/>
+              </a:rPr>
+              <a:t>]) {</a:t>
+            </a:r>
+          </a:p>
+          <a:p>
+            <a:r>
+              <a:rPr lang="en-US" b="0" dirty="0">
+                <a:solidFill>
+                  <a:srgbClr val="000000"/>
+                </a:solidFill>
+                <a:effectLst/>
+                <a:latin typeface="Consolas" panose="020B0609020204030204" pitchFamily="49" charset="0"/>
+              </a:rPr>
+              <a:t>            *result = </a:t>
+            </a:r>
+            <a:r>
+              <a:rPr lang="en-US" b="0" dirty="0" err="1">
+                <a:solidFill>
+                  <a:srgbClr val="000000"/>
+                </a:solidFill>
+                <a:effectLst/>
+                <a:latin typeface="Consolas" panose="020B0609020204030204" pitchFamily="49" charset="0"/>
+              </a:rPr>
+              <a:t>i</a:t>
+            </a:r>
+            <a:r>
+              <a:rPr lang="en-US" b="0" dirty="0">
+                <a:solidFill>
+                  <a:srgbClr val="000000"/>
+                </a:solidFill>
+                <a:effectLst/>
+                <a:latin typeface="Consolas" panose="020B0609020204030204" pitchFamily="49" charset="0"/>
+              </a:rPr>
+              <a:t>;</a:t>
+            </a:r>
+          </a:p>
+          <a:p>
+            <a:r>
+              <a:rPr lang="en-US" b="0" dirty="0">
+                <a:solidFill>
+                  <a:srgbClr val="000000"/>
+                </a:solidFill>
+                <a:effectLst/>
+                <a:latin typeface="Consolas" panose="020B0609020204030204" pitchFamily="49" charset="0"/>
+              </a:rPr>
+              <a:t>            </a:t>
+            </a:r>
+            <a:r>
+              <a:rPr lang="en-US" b="0" dirty="0">
+                <a:solidFill>
+                  <a:srgbClr val="0000FF"/>
+                </a:solidFill>
+                <a:effectLst/>
+                <a:latin typeface="Consolas" panose="020B0609020204030204" pitchFamily="49" charset="0"/>
+              </a:rPr>
+              <a:t>return</a:t>
+            </a:r>
+            <a:r>
+              <a:rPr lang="en-US" b="0" dirty="0">
+                <a:solidFill>
+                  <a:srgbClr val="000000"/>
+                </a:solidFill>
+                <a:effectLst/>
+                <a:latin typeface="Consolas" panose="020B0609020204030204" pitchFamily="49" charset="0"/>
+              </a:rPr>
+              <a:t>;</a:t>
+            </a:r>
+          </a:p>
+          <a:p>
+            <a:r>
+              <a:rPr lang="en-US" b="0" dirty="0">
+                <a:solidFill>
+                  <a:srgbClr val="000000"/>
+                </a:solidFill>
+                <a:effectLst/>
+                <a:latin typeface="Consolas" panose="020B0609020204030204" pitchFamily="49" charset="0"/>
+              </a:rPr>
+              <a:t>        }</a:t>
+            </a:r>
+          </a:p>
+          <a:p>
+            <a:r>
+              <a:rPr lang="en-US" b="0" dirty="0">
+                <a:solidFill>
+                  <a:srgbClr val="000000"/>
+                </a:solidFill>
+                <a:effectLst/>
+                <a:latin typeface="Consolas" panose="020B0609020204030204" pitchFamily="49" charset="0"/>
+              </a:rPr>
+              <a:t>    }</a:t>
+            </a:r>
+          </a:p>
+          <a:p>
+            <a:br>
+              <a:rPr lang="en-US" b="0" dirty="0">
+                <a:solidFill>
+                  <a:srgbClr val="000000"/>
+                </a:solidFill>
+                <a:effectLst/>
+                <a:latin typeface="Consolas" panose="020B0609020204030204" pitchFamily="49" charset="0"/>
+              </a:rPr>
+            </a:br>
+            <a:r>
+              <a:rPr lang="en-US" b="0" dirty="0">
+                <a:solidFill>
+                  <a:srgbClr val="000000"/>
+                </a:solidFill>
+                <a:effectLst/>
+                <a:latin typeface="Consolas" panose="020B0609020204030204" pitchFamily="49" charset="0"/>
+              </a:rPr>
+              <a:t>    result = </a:t>
+            </a:r>
+            <a:r>
+              <a:rPr lang="en-US" b="0" dirty="0" err="1">
+                <a:solidFill>
+                  <a:srgbClr val="0000FF"/>
+                </a:solidFill>
+                <a:effectLst/>
+                <a:latin typeface="Consolas" panose="020B0609020204030204" pitchFamily="49" charset="0"/>
+              </a:rPr>
+              <a:t>nullptr</a:t>
+            </a:r>
+            <a:r>
+              <a:rPr lang="en-US" b="0" dirty="0">
+                <a:solidFill>
+                  <a:srgbClr val="000000"/>
+                </a:solidFill>
+                <a:effectLst/>
+                <a:latin typeface="Consolas" panose="020B0609020204030204" pitchFamily="49" charset="0"/>
+              </a:rPr>
+              <a:t>;</a:t>
+            </a:r>
+          </a:p>
+          <a:p>
+            <a:r>
+              <a:rPr lang="en-US" b="0" dirty="0">
+                <a:solidFill>
+                  <a:srgbClr val="000000"/>
+                </a:solidFill>
+                <a:effectLst/>
+                <a:latin typeface="Consolas" panose="020B0609020204030204" pitchFamily="49" charset="0"/>
+              </a:rPr>
+              <a:t>}</a:t>
+            </a:r>
+          </a:p>
+        </p:txBody>
+      </p:sp>
+      <p:sp>
+        <p:nvSpPr>
+          <p:cNvPr id="11" name="TextBox 10">
+            <a:extLst>
+              <a:ext uri="{FF2B5EF4-FFF2-40B4-BE49-F238E27FC236}">
+                <a16:creationId xmlns:a16="http://schemas.microsoft.com/office/drawing/2014/main" id="{BF732F0C-1B8A-4D97-A2A4-F49F883DA873}"/>
+              </a:ext>
+            </a:extLst>
+          </p:cNvPr>
+          <p:cNvSpPr txBox="1"/>
+          <p:nvPr/>
+        </p:nvSpPr>
+        <p:spPr>
+          <a:xfrm>
+            <a:off x="1079862" y="4530781"/>
+            <a:ext cx="6309360" cy="1754326"/>
+          </a:xfrm>
+          <a:prstGeom prst="rect">
+            <a:avLst/>
+          </a:prstGeom>
+          <a:noFill/>
+        </p:spPr>
+        <p:txBody>
+          <a:bodyPr wrap="square">
+            <a:spAutoFit/>
+          </a:bodyPr>
+          <a:lstStyle/>
+          <a:p>
+            <a:r>
+              <a:rPr lang="en-US" b="0" dirty="0">
+                <a:solidFill>
+                  <a:srgbClr val="0000FF"/>
+                </a:solidFill>
+                <a:effectLst/>
+                <a:latin typeface="Consolas" panose="020B0609020204030204" pitchFamily="49" charset="0"/>
+              </a:rPr>
+              <a:t>void</a:t>
+            </a:r>
+            <a:r>
+              <a:rPr lang="en-US" b="0" dirty="0">
+                <a:solidFill>
+                  <a:srgbClr val="000000"/>
+                </a:solidFill>
+                <a:effectLst/>
+                <a:latin typeface="Consolas" panose="020B0609020204030204" pitchFamily="49" charset="0"/>
+              </a:rPr>
+              <a:t> </a:t>
+            </a:r>
+            <a:r>
+              <a:rPr lang="en-US" b="0" dirty="0" err="1">
+                <a:solidFill>
+                  <a:srgbClr val="000000"/>
+                </a:solidFill>
+                <a:effectLst/>
+                <a:latin typeface="Consolas" panose="020B0609020204030204" pitchFamily="49" charset="0"/>
+              </a:rPr>
+              <a:t>linear_search</a:t>
+            </a:r>
+            <a:r>
+              <a:rPr lang="en-US" b="0" dirty="0">
+                <a:solidFill>
+                  <a:srgbClr val="000000"/>
+                </a:solidFill>
+                <a:effectLst/>
+                <a:latin typeface="Consolas" panose="020B0609020204030204" pitchFamily="49" charset="0"/>
+              </a:rPr>
+              <a:t>(vector&lt;</a:t>
+            </a:r>
+            <a:r>
+              <a:rPr lang="en-US" b="0" dirty="0">
+                <a:solidFill>
+                  <a:srgbClr val="0000FF"/>
+                </a:solidFill>
+                <a:effectLst/>
+                <a:latin typeface="Consolas" panose="020B0609020204030204" pitchFamily="49" charset="0"/>
+              </a:rPr>
+              <a:t>int</a:t>
+            </a:r>
+            <a:r>
+              <a:rPr lang="en-US" b="0" dirty="0">
+                <a:solidFill>
+                  <a:srgbClr val="000000"/>
+                </a:solidFill>
+                <a:effectLst/>
+                <a:latin typeface="Consolas" panose="020B0609020204030204" pitchFamily="49" charset="0"/>
+              </a:rPr>
+              <a:t>&gt; &amp;v, </a:t>
+            </a:r>
+            <a:r>
+              <a:rPr lang="en-US" b="0" dirty="0">
+                <a:solidFill>
+                  <a:srgbClr val="0000FF"/>
+                </a:solidFill>
+                <a:effectLst/>
+                <a:latin typeface="Consolas" panose="020B0609020204030204" pitchFamily="49" charset="0"/>
+              </a:rPr>
+              <a:t>int</a:t>
+            </a:r>
+            <a:r>
+              <a:rPr lang="en-US" b="0" dirty="0">
+                <a:solidFill>
+                  <a:srgbClr val="000000"/>
+                </a:solidFill>
+                <a:effectLst/>
+                <a:latin typeface="Consolas" panose="020B0609020204030204" pitchFamily="49" charset="0"/>
+              </a:rPr>
+              <a:t> target, </a:t>
+            </a:r>
+            <a:r>
+              <a:rPr lang="en-US" b="0" dirty="0">
+                <a:solidFill>
+                  <a:srgbClr val="0000FF"/>
+                </a:solidFill>
+                <a:effectLst/>
+                <a:latin typeface="Consolas" panose="020B0609020204030204" pitchFamily="49" charset="0"/>
+              </a:rPr>
+              <a:t>int</a:t>
+            </a:r>
+            <a:r>
+              <a:rPr lang="en-US" b="0" dirty="0">
+                <a:solidFill>
+                  <a:srgbClr val="000000"/>
+                </a:solidFill>
+                <a:effectLst/>
+                <a:latin typeface="Consolas" panose="020B0609020204030204" pitchFamily="49" charset="0"/>
+              </a:rPr>
+              <a:t> * result) {</a:t>
+            </a:r>
+          </a:p>
+          <a:p>
+            <a:r>
+              <a:rPr lang="en-US" b="0" dirty="0">
+                <a:solidFill>
+                  <a:srgbClr val="000000"/>
+                </a:solidFill>
+                <a:effectLst/>
+                <a:latin typeface="Consolas" panose="020B0609020204030204" pitchFamily="49" charset="0"/>
+              </a:rPr>
+              <a:t>    </a:t>
+            </a:r>
+            <a:r>
+              <a:rPr lang="en-US" b="0" dirty="0">
+                <a:solidFill>
+                  <a:srgbClr val="0000FF"/>
+                </a:solidFill>
+                <a:effectLst/>
+                <a:latin typeface="Consolas" panose="020B0609020204030204" pitchFamily="49" charset="0"/>
+              </a:rPr>
+              <a:t>auto</a:t>
+            </a:r>
+            <a:r>
+              <a:rPr lang="en-US" b="0" dirty="0">
+                <a:solidFill>
+                  <a:srgbClr val="000000"/>
+                </a:solidFill>
+                <a:effectLst/>
+                <a:latin typeface="Consolas" panose="020B0609020204030204" pitchFamily="49" charset="0"/>
+              </a:rPr>
+              <a:t> it = find(</a:t>
+            </a:r>
+            <a:r>
+              <a:rPr lang="en-US" b="0" dirty="0" err="1">
+                <a:solidFill>
+                  <a:srgbClr val="000000"/>
+                </a:solidFill>
+                <a:effectLst/>
+                <a:latin typeface="Consolas" panose="020B0609020204030204" pitchFamily="49" charset="0"/>
+              </a:rPr>
+              <a:t>v.begin</a:t>
+            </a:r>
+            <a:r>
+              <a:rPr lang="en-US" b="0" dirty="0">
+                <a:solidFill>
+                  <a:srgbClr val="000000"/>
+                </a:solidFill>
+                <a:effectLst/>
+                <a:latin typeface="Consolas" panose="020B0609020204030204" pitchFamily="49" charset="0"/>
+              </a:rPr>
+              <a:t>(), </a:t>
+            </a:r>
+            <a:r>
+              <a:rPr lang="en-US" b="0" dirty="0" err="1">
+                <a:solidFill>
+                  <a:srgbClr val="000000"/>
+                </a:solidFill>
+                <a:effectLst/>
+                <a:latin typeface="Consolas" panose="020B0609020204030204" pitchFamily="49" charset="0"/>
+              </a:rPr>
+              <a:t>v.end</a:t>
+            </a:r>
+            <a:r>
+              <a:rPr lang="en-US" b="0" dirty="0">
+                <a:solidFill>
+                  <a:srgbClr val="000000"/>
+                </a:solidFill>
+                <a:effectLst/>
+                <a:latin typeface="Consolas" panose="020B0609020204030204" pitchFamily="49" charset="0"/>
+              </a:rPr>
+              <a:t>(), target);</a:t>
+            </a:r>
+          </a:p>
+          <a:p>
+            <a:br>
+              <a:rPr lang="en-US" b="0" dirty="0">
+                <a:solidFill>
+                  <a:srgbClr val="000000"/>
+                </a:solidFill>
+                <a:effectLst/>
+                <a:latin typeface="Consolas" panose="020B0609020204030204" pitchFamily="49" charset="0"/>
+              </a:rPr>
+            </a:br>
+            <a:r>
+              <a:rPr lang="en-US" b="0" dirty="0">
+                <a:solidFill>
+                  <a:srgbClr val="000000"/>
+                </a:solidFill>
+                <a:effectLst/>
+                <a:latin typeface="Consolas" panose="020B0609020204030204" pitchFamily="49" charset="0"/>
+              </a:rPr>
+              <a:t>    *result = it - </a:t>
+            </a:r>
+            <a:r>
+              <a:rPr lang="en-US" b="0" dirty="0" err="1">
+                <a:solidFill>
+                  <a:srgbClr val="000000"/>
+                </a:solidFill>
+                <a:effectLst/>
+                <a:latin typeface="Consolas" panose="020B0609020204030204" pitchFamily="49" charset="0"/>
+              </a:rPr>
+              <a:t>v.begin</a:t>
+            </a:r>
+            <a:r>
+              <a:rPr lang="en-US" b="0" dirty="0">
+                <a:solidFill>
+                  <a:srgbClr val="000000"/>
+                </a:solidFill>
+                <a:effectLst/>
+                <a:latin typeface="Consolas" panose="020B0609020204030204" pitchFamily="49" charset="0"/>
+              </a:rPr>
+              <a:t>();</a:t>
+            </a:r>
+          </a:p>
+          <a:p>
+            <a:r>
+              <a:rPr lang="en-US" b="0" dirty="0">
+                <a:solidFill>
+                  <a:srgbClr val="000000"/>
+                </a:solidFill>
+                <a:effectLst/>
+                <a:latin typeface="Consolas" panose="020B0609020204030204" pitchFamily="49" charset="0"/>
+              </a:rPr>
+              <a:t>}</a:t>
+            </a:r>
+          </a:p>
+        </p:txBody>
+      </p:sp>
+    </p:spTree>
+    <p:extLst>
+      <p:ext uri="{BB962C8B-B14F-4D97-AF65-F5344CB8AC3E}">
+        <p14:creationId xmlns:p14="http://schemas.microsoft.com/office/powerpoint/2010/main" val="4102383082"/>
+      </p:ext>
+    </p:extLst>
+  </p:cSld>
+  <p:clrMapOvr>
+    <a:masterClrMapping/>
+  </p:clrMapOvr>
+</p:sld>
+</file>
+
+<file path=ppt/slides/slide6.xml><?xml version="1.0" encoding="utf-8"?>
+<p:sld xmlns:a="http://schemas.openxmlformats.org/drawingml/2006/main" xmlns:r="http://schemas.openxmlformats.org/officeDocument/2006/relationships" xmlns:p="http://schemas.openxmlformats.org/presentationml/2006/main">
+  <p:cSld>
+    <p:spTree>
+      <p:nvGrpSpPr>
+        <p:cNvPr id="1" name=""/>
+        <p:cNvGrpSpPr/>
+        <p:nvPr/>
+      </p:nvGrpSpPr>
+      <p:grpSpPr>
+        <a:xfrm>
+          <a:off x="0" y="0"/>
+          <a:ext cx="0" cy="0"/>
+          <a:chOff x="0" y="0"/>
+          <a:chExt cx="0" cy="0"/>
+        </a:xfrm>
+      </p:grpSpPr>
+      <p:sp>
+        <p:nvSpPr>
+          <p:cNvPr id="4" name="Прямоугольник 3">
+            <a:extLst>
+              <a:ext uri="{FF2B5EF4-FFF2-40B4-BE49-F238E27FC236}">
+                <a16:creationId xmlns:a16="http://schemas.microsoft.com/office/drawing/2014/main" id="{3B50E5F9-D4EB-4741-B0F3-5D2A58E9DC49}"/>
+              </a:ext>
+            </a:extLst>
+          </p:cNvPr>
+          <p:cNvSpPr/>
+          <p:nvPr/>
+        </p:nvSpPr>
+        <p:spPr>
+          <a:xfrm>
+            <a:off x="-425390" y="7274925"/>
+            <a:ext cx="11737910" cy="6475445"/>
+          </a:xfrm>
+          <a:prstGeom prst="rect">
+            <a:avLst/>
+          </a:prstGeom>
+          <a:solidFill>
+            <a:schemeClr val="bg1"/>
+          </a:solidFill>
+        </p:spPr>
+        <p:style>
+          <a:lnRef idx="2">
+            <a:schemeClr val="accent1">
+              <a:shade val="50000"/>
+            </a:schemeClr>
+          </a:lnRef>
+          <a:fillRef idx="1">
+            <a:schemeClr val="accent1"/>
+          </a:fillRef>
+          <a:effectRef idx="0">
+            <a:schemeClr val="accent1"/>
+          </a:effectRef>
+          <a:fontRef idx="minor">
+            <a:schemeClr val="lt1"/>
+          </a:fontRef>
+        </p:style>
+        <p:txBody>
+          <a:bodyPr rtlCol="0" anchor="ctr"/>
+          <a:lstStyle/>
+          <a:p>
+            <a:pPr algn="ctr"/>
+            <a:r>
+              <a:rPr lang="ru-RU" dirty="0">
+                <a:solidFill>
+                  <a:schemeClr val="tx1"/>
+                </a:solidFill>
+              </a:rPr>
+              <a:t> </a:t>
+            </a:r>
+          </a:p>
+        </p:txBody>
+      </p:sp>
+      <p:sp>
+        <p:nvSpPr>
+          <p:cNvPr id="6" name="TextBox 5">
+            <a:extLst>
+              <a:ext uri="{FF2B5EF4-FFF2-40B4-BE49-F238E27FC236}">
+                <a16:creationId xmlns:a16="http://schemas.microsoft.com/office/drawing/2014/main" id="{0CD8FB8A-100E-402A-B8DB-2D1CE735DE97}"/>
+              </a:ext>
+            </a:extLst>
+          </p:cNvPr>
+          <p:cNvSpPr txBox="1"/>
+          <p:nvPr/>
+        </p:nvSpPr>
+        <p:spPr>
+          <a:xfrm>
+            <a:off x="975360" y="427507"/>
+            <a:ext cx="4861972" cy="1107996"/>
+          </a:xfrm>
+          <a:prstGeom prst="rect">
+            <a:avLst/>
+          </a:prstGeom>
+          <a:noFill/>
+        </p:spPr>
+        <p:txBody>
+          <a:bodyPr wrap="none" rtlCol="0">
+            <a:spAutoFit/>
+          </a:bodyPr>
+          <a:lstStyle/>
+          <a:p>
+            <a:r>
+              <a:rPr lang="en-US" sz="6600" dirty="0"/>
+              <a:t>Binary Search</a:t>
+            </a:r>
+            <a:endParaRPr lang="ru-RU" sz="6600" dirty="0"/>
+          </a:p>
+        </p:txBody>
+      </p:sp>
+      <p:cxnSp>
+        <p:nvCxnSpPr>
+          <p:cNvPr id="9" name="Прямая соединительная линия 8">
+            <a:extLst>
+              <a:ext uri="{FF2B5EF4-FFF2-40B4-BE49-F238E27FC236}">
+                <a16:creationId xmlns:a16="http://schemas.microsoft.com/office/drawing/2014/main" id="{8A0B85AB-B544-4ECE-AF8C-C25AC44F264C}"/>
+              </a:ext>
+            </a:extLst>
+          </p:cNvPr>
+          <p:cNvCxnSpPr/>
+          <p:nvPr/>
+        </p:nvCxnSpPr>
+        <p:spPr>
+          <a:xfrm>
+            <a:off x="1079862" y="1349831"/>
+            <a:ext cx="5390607" cy="0"/>
+          </a:xfrm>
+          <a:prstGeom prst="line">
+            <a:avLst/>
+          </a:prstGeom>
+          <a:ln/>
+        </p:spPr>
+        <p:style>
+          <a:lnRef idx="3">
+            <a:schemeClr val="dk1"/>
+          </a:lnRef>
+          <a:fillRef idx="0">
+            <a:schemeClr val="dk1"/>
+          </a:fillRef>
+          <a:effectRef idx="2">
+            <a:schemeClr val="dk1"/>
+          </a:effectRef>
+          <a:fontRef idx="minor">
+            <a:schemeClr val="tx1"/>
+          </a:fontRef>
+        </p:style>
+      </p:cxnSp>
+      <p:sp>
+        <p:nvSpPr>
+          <p:cNvPr id="2" name="TextBox 1">
+            <a:extLst>
+              <a:ext uri="{FF2B5EF4-FFF2-40B4-BE49-F238E27FC236}">
+                <a16:creationId xmlns:a16="http://schemas.microsoft.com/office/drawing/2014/main" id="{B2F2FDE6-48A9-49D9-954C-06C9D888A093}"/>
+              </a:ext>
+            </a:extLst>
+          </p:cNvPr>
+          <p:cNvSpPr txBox="1"/>
+          <p:nvPr/>
+        </p:nvSpPr>
+        <p:spPr>
+          <a:xfrm>
+            <a:off x="975360" y="1535503"/>
+            <a:ext cx="9347200" cy="4893647"/>
+          </a:xfrm>
+          <a:prstGeom prst="rect">
+            <a:avLst/>
+          </a:prstGeom>
+          <a:noFill/>
+        </p:spPr>
+        <p:txBody>
           <a:bodyPr wrap="square" rtlCol="0">
             <a:spAutoFit/>
           </a:bodyPr>
@@ -5656,7 +5898,15 @@
             </a:pPr>
             <a:r>
               <a:rPr lang="ru-RU" sz="2400" dirty="0"/>
-              <a:t>В зависимости от результатов сравнения выделяется подмножество, в котором будет продолжаться поиск с п.1</a:t>
+              <a:t>В зависимости от результатов сравнения выделяется подмножество</a:t>
+            </a:r>
+            <a:r>
+              <a:rPr lang="en-US" sz="2400" dirty="0"/>
+              <a:t> </a:t>
+            </a:r>
+            <a:r>
+              <a:rPr lang="ru-RU" sz="2400" dirty="0"/>
+              <a:t>слева или справа от опорного элемента, в котором будет продолжаться поиск с п.1</a:t>
             </a:r>
           </a:p>
           <a:p>
@@ -5668,6 +5918,61 @@
               <a:rPr lang="ru-RU" sz="2400" dirty="0"/>
               <a:t>Поиск продолжается пока опорный элемент не равен искомому, или из множества нельзя выделить подмножество.</a:t>
             </a:r>
+            <a:endParaRPr lang="en-US" sz="2400" dirty="0"/>
+          </a:p>
+          <a:p>
+            <a:pPr marL="342900" indent="-342900">
+              <a:buFont typeface="+mj-lt"/>
+              <a:buAutoNum type="arabicPeriod"/>
+            </a:pPr>
+            <a:endParaRPr lang="en-US" sz="2400" dirty="0"/>
+          </a:p>
+          <a:p>
+            <a:pPr marL="342900" indent="-342900">
+              <a:buFont typeface="+mj-lt"/>
+              <a:buAutoNum type="arabicPeriod"/>
+            </a:pPr>
+            <a:endParaRPr lang="en-US" sz="2400" dirty="0"/>
+          </a:p>
+          <a:p>
+            <a:pPr marL="342900" indent="-342900">
+              <a:buFont typeface="+mj-lt"/>
+              <a:buAutoNum type="arabicPeriod"/>
+            </a:pPr>
+            <a:endParaRPr lang="en-US" sz="2400" dirty="0"/>
+          </a:p>
+          <a:p>
+            <a:pPr marL="342900" indent="-342900">
+              <a:buFont typeface="Arial" panose="020B0604020202020204" pitchFamily="34" charset="0"/>
+              <a:buChar char="•"/>
+            </a:pPr>
+            <a:r>
+              <a:rPr lang="en-US" sz="2400" dirty="0"/>
+              <a:t>C</a:t>
+            </a:r>
+            <a:r>
+              <a:rPr lang="ru-RU" sz="2400" dirty="0"/>
+              <a:t>ложность такого поиска </a:t>
+            </a:r>
+            <a:r>
+              <a:rPr lang="en-US" sz="2400" dirty="0"/>
+              <a:t>O(log N)</a:t>
+            </a:r>
+            <a:r>
+              <a:rPr lang="ru-RU" sz="2400" dirty="0"/>
+              <a:t>, что существенно быстрее.</a:t>
+            </a:r>
+            <a:endParaRPr lang="en-US" sz="2400" dirty="0"/>
+          </a:p>
+          <a:p>
+            <a:pPr marL="342900" indent="-342900">
+              <a:buFont typeface="Arial" panose="020B0604020202020204" pitchFamily="34" charset="0"/>
+              <a:buChar char="•"/>
+            </a:pPr>
+            <a:r>
+              <a:rPr lang="ru-RU" sz="2400" dirty="0"/>
+              <a:t>Но какое обязательное условие для такого поиска?</a:t>
+            </a:r>
           </a:p>
         </p:txBody>
       </p:sp>
@@ -5675,6 +5980,1270 @@
     <p:extLst>
       <p:ext uri="{BB962C8B-B14F-4D97-AF65-F5344CB8AC3E}">
         <p14:creationId xmlns:p14="http://schemas.microsoft.com/office/powerpoint/2010/main" val="429590691"/>
+      </p:ext>
+    </p:extLst>
+  </p:cSld>
+  <p:clrMapOvr>
+    <a:masterClrMapping/>
+  </p:clrMapOvr>
+</p:sld>
+</file>
+
+<file path=ppt/slides/slide7.xml><?xml version="1.0" encoding="utf-8"?>
+<p:sld xmlns:a="http://schemas.openxmlformats.org/drawingml/2006/main" xmlns:r="http://schemas.openxmlformats.org/officeDocument/2006/relationships" xmlns:p="http://schemas.openxmlformats.org/presentationml/2006/main">
+  <p:cSld>
+    <p:spTree>
+      <p:nvGrpSpPr>
+        <p:cNvPr id="1" name=""/>
+        <p:cNvGrpSpPr/>
+        <p:nvPr/>
+      </p:nvGrpSpPr>
+      <p:grpSpPr>
+        <a:xfrm>
+          <a:off x="0" y="0"/>
+          <a:ext cx="0" cy="0"/>
+          <a:chOff x="0" y="0"/>
+          <a:chExt cx="0" cy="0"/>
+        </a:xfrm>
+      </p:grpSpPr>
+      <p:sp>
+        <p:nvSpPr>
+          <p:cNvPr id="4" name="Прямоугольник 3">
+            <a:extLst>
+              <a:ext uri="{FF2B5EF4-FFF2-40B4-BE49-F238E27FC236}">
+                <a16:creationId xmlns:a16="http://schemas.microsoft.com/office/drawing/2014/main" id="{3B50E5F9-D4EB-4741-B0F3-5D2A58E9DC49}"/>
+              </a:ext>
+            </a:extLst>
+          </p:cNvPr>
+          <p:cNvSpPr/>
+          <p:nvPr/>
+        </p:nvSpPr>
+        <p:spPr>
+          <a:xfrm>
+            <a:off x="-425390" y="7274925"/>
+            <a:ext cx="11737910" cy="6475445"/>
+          </a:xfrm>
+          <a:prstGeom prst="rect">
+            <a:avLst/>
+          </a:prstGeom>
+          <a:solidFill>
+            <a:schemeClr val="bg1"/>
+          </a:solidFill>
+        </p:spPr>
+        <p:style>
+          <a:lnRef idx="2">
+            <a:schemeClr val="accent1">
+              <a:shade val="50000"/>
+            </a:schemeClr>
+          </a:lnRef>
+          <a:fillRef idx="1">
+            <a:schemeClr val="accent1"/>
+          </a:fillRef>
+          <a:effectRef idx="0">
+            <a:schemeClr val="accent1"/>
+          </a:effectRef>
+          <a:fontRef idx="minor">
+            <a:schemeClr val="lt1"/>
+          </a:fontRef>
+        </p:style>
+        <p:txBody>
+          <a:bodyPr rtlCol="0" anchor="ctr"/>
+          <a:lstStyle/>
+          <a:p>
+            <a:pPr algn="ctr"/>
+            <a:r>
+              <a:rPr lang="ru-RU" dirty="0">
+                <a:solidFill>
+                  <a:schemeClr val="tx1"/>
+                </a:solidFill>
+              </a:rPr>
+              <a:t> </a:t>
+            </a:r>
+          </a:p>
+        </p:txBody>
+      </p:sp>
+      <p:sp>
+        <p:nvSpPr>
+          <p:cNvPr id="6" name="TextBox 5">
+            <a:extLst>
+              <a:ext uri="{FF2B5EF4-FFF2-40B4-BE49-F238E27FC236}">
+                <a16:creationId xmlns:a16="http://schemas.microsoft.com/office/drawing/2014/main" id="{0CD8FB8A-100E-402A-B8DB-2D1CE735DE97}"/>
+              </a:ext>
+            </a:extLst>
+          </p:cNvPr>
+          <p:cNvSpPr txBox="1"/>
+          <p:nvPr/>
+        </p:nvSpPr>
+        <p:spPr>
+          <a:xfrm>
+            <a:off x="975360" y="427507"/>
+            <a:ext cx="4861972" cy="1107996"/>
+          </a:xfrm>
+          <a:prstGeom prst="rect">
+            <a:avLst/>
+          </a:prstGeom>
+          <a:noFill/>
+        </p:spPr>
+        <p:txBody>
+          <a:bodyPr wrap="none" rtlCol="0">
+            <a:spAutoFit/>
+          </a:bodyPr>
+          <a:lstStyle/>
+          <a:p>
+            <a:r>
+              <a:rPr lang="en-US" sz="6600" dirty="0"/>
+              <a:t>Binary Search</a:t>
+            </a:r>
+            <a:endParaRPr lang="ru-RU" sz="6600" dirty="0"/>
+          </a:p>
+        </p:txBody>
+      </p:sp>
+      <p:cxnSp>
+        <p:nvCxnSpPr>
+          <p:cNvPr id="9" name="Прямая соединительная линия 8">
+            <a:extLst>
+              <a:ext uri="{FF2B5EF4-FFF2-40B4-BE49-F238E27FC236}">
+                <a16:creationId xmlns:a16="http://schemas.microsoft.com/office/drawing/2014/main" id="{8A0B85AB-B544-4ECE-AF8C-C25AC44F264C}"/>
+              </a:ext>
+            </a:extLst>
+          </p:cNvPr>
+          <p:cNvCxnSpPr/>
+          <p:nvPr/>
+        </p:nvCxnSpPr>
+        <p:spPr>
+          <a:xfrm>
+            <a:off x="1079862" y="1349831"/>
+            <a:ext cx="5390607" cy="0"/>
+          </a:xfrm>
+          <a:prstGeom prst="line">
+            <a:avLst/>
+          </a:prstGeom>
+          <a:ln/>
+        </p:spPr>
+        <p:style>
+          <a:lnRef idx="3">
+            <a:schemeClr val="dk1"/>
+          </a:lnRef>
+          <a:fillRef idx="0">
+            <a:schemeClr val="dk1"/>
+          </a:fillRef>
+          <a:effectRef idx="2">
+            <a:schemeClr val="dk1"/>
+          </a:effectRef>
+          <a:fontRef idx="minor">
+            <a:schemeClr val="tx1"/>
+          </a:fontRef>
+        </p:style>
+      </p:cxnSp>
+      <p:pic>
+        <p:nvPicPr>
+          <p:cNvPr id="7" name="Рисунок 6">
+            <a:extLst>
+              <a:ext uri="{FF2B5EF4-FFF2-40B4-BE49-F238E27FC236}">
+                <a16:creationId xmlns:a16="http://schemas.microsoft.com/office/drawing/2014/main" id="{878AC329-BC12-A05C-1864-62A860989D2B}"/>
+              </a:ext>
+            </a:extLst>
+          </p:cNvPr>
+          <p:cNvPicPr>
+            <a:picLocks noChangeAspect="1"/>
+          </p:cNvPicPr>
+          <p:nvPr/>
+        </p:nvPicPr>
+        <p:blipFill rotWithShape="1">
+          <a:blip r:embed="rId2">
+            <a:extLst>
+              <a:ext uri="{28A0092B-C50C-407E-A947-70E740481C1C}">
+                <a14:useLocalDpi xmlns:a14="http://schemas.microsoft.com/office/drawing/2010/main" val="0"/>
+              </a:ext>
+            </a:extLst>
+          </a:blip>
+          <a:srcRect l="3044" t="20152" r="8261" b="13135"/>
+          <a:stretch/>
+        </p:blipFill>
+        <p:spPr>
+          <a:xfrm>
+            <a:off x="1828800" y="1949950"/>
+            <a:ext cx="8758464" cy="3668972"/>
+          </a:xfrm>
+          <a:prstGeom prst="rect">
+            <a:avLst/>
+          </a:prstGeom>
+        </p:spPr>
+      </p:pic>
+    </p:spTree>
+    <p:extLst>
+      <p:ext uri="{BB962C8B-B14F-4D97-AF65-F5344CB8AC3E}">
+        <p14:creationId xmlns:p14="http://schemas.microsoft.com/office/powerpoint/2010/main" val="1835264469"/>
+      </p:ext>
+    </p:extLst>
+  </p:cSld>
+  <p:clrMapOvr>
+    <a:masterClrMapping/>
+  </p:clrMapOvr>
+</p:sld>
+</file>
+
+<file path=ppt/slides/slide8.xml><?xml version="1.0" encoding="utf-8"?>
+<p:sld xmlns:a="http://schemas.openxmlformats.org/drawingml/2006/main" xmlns:r="http://schemas.openxmlformats.org/officeDocument/2006/relationships" xmlns:p="http://schemas.openxmlformats.org/presentationml/2006/main">
+  <p:cSld>
+    <p:spTree>
+      <p:nvGrpSpPr>
+        <p:cNvPr id="1" name=""/>
+        <p:cNvGrpSpPr/>
+        <p:nvPr/>
+      </p:nvGrpSpPr>
+      <p:grpSpPr>
+        <a:xfrm>
+          <a:off x="0" y="0"/>
+          <a:ext cx="0" cy="0"/>
+          <a:chOff x="0" y="0"/>
+          <a:chExt cx="0" cy="0"/>
+        </a:xfrm>
+      </p:grpSpPr>
+      <p:sp>
+        <p:nvSpPr>
+          <p:cNvPr id="4" name="Прямоугольник 3">
+            <a:extLst>
+              <a:ext uri="{FF2B5EF4-FFF2-40B4-BE49-F238E27FC236}">
+                <a16:creationId xmlns:a16="http://schemas.microsoft.com/office/drawing/2014/main" id="{3B50E5F9-D4EB-4741-B0F3-5D2A58E9DC49}"/>
+              </a:ext>
+            </a:extLst>
+          </p:cNvPr>
+          <p:cNvSpPr/>
+          <p:nvPr/>
+        </p:nvSpPr>
+        <p:spPr>
+          <a:xfrm>
+            <a:off x="-425390" y="7274925"/>
+            <a:ext cx="11737910" cy="6475445"/>
+          </a:xfrm>
+          <a:prstGeom prst="rect">
+            <a:avLst/>
+          </a:prstGeom>
+          <a:solidFill>
+            <a:schemeClr val="bg1"/>
+          </a:solidFill>
+        </p:spPr>
+        <p:style>
+          <a:lnRef idx="2">
+            <a:schemeClr val="accent1">
+              <a:shade val="50000"/>
+            </a:schemeClr>
+          </a:lnRef>
+          <a:fillRef idx="1">
+            <a:schemeClr val="accent1"/>
+          </a:fillRef>
+          <a:effectRef idx="0">
+            <a:schemeClr val="accent1"/>
+          </a:effectRef>
+          <a:fontRef idx="minor">
+            <a:schemeClr val="lt1"/>
+          </a:fontRef>
+        </p:style>
+        <p:txBody>
+          <a:bodyPr rtlCol="0" anchor="ctr"/>
+          <a:lstStyle/>
+          <a:p>
+            <a:pPr algn="ctr"/>
+            <a:r>
+              <a:rPr lang="ru-RU" dirty="0">
+                <a:solidFill>
+                  <a:schemeClr val="tx1"/>
+                </a:solidFill>
+              </a:rPr>
+              <a:t> </a:t>
+            </a:r>
+          </a:p>
+        </p:txBody>
+      </p:sp>
+      <p:sp>
+        <p:nvSpPr>
+          <p:cNvPr id="6" name="TextBox 5">
+            <a:extLst>
+              <a:ext uri="{FF2B5EF4-FFF2-40B4-BE49-F238E27FC236}">
+                <a16:creationId xmlns:a16="http://schemas.microsoft.com/office/drawing/2014/main" id="{0CD8FB8A-100E-402A-B8DB-2D1CE735DE97}"/>
+              </a:ext>
+            </a:extLst>
+          </p:cNvPr>
+          <p:cNvSpPr txBox="1"/>
+          <p:nvPr/>
+        </p:nvSpPr>
+        <p:spPr>
+          <a:xfrm>
+            <a:off x="975360" y="427507"/>
+            <a:ext cx="4861972" cy="1107996"/>
+          </a:xfrm>
+          <a:prstGeom prst="rect">
+            <a:avLst/>
+          </a:prstGeom>
+          <a:noFill/>
+        </p:spPr>
+        <p:txBody>
+          <a:bodyPr wrap="none" rtlCol="0">
+            <a:spAutoFit/>
+          </a:bodyPr>
+          <a:lstStyle/>
+          <a:p>
+            <a:r>
+              <a:rPr lang="en-US" sz="6600" dirty="0"/>
+              <a:t>Binary Search</a:t>
+            </a:r>
+            <a:endParaRPr lang="ru-RU" sz="6600" dirty="0"/>
+          </a:p>
+        </p:txBody>
+      </p:sp>
+      <p:cxnSp>
+        <p:nvCxnSpPr>
+          <p:cNvPr id="9" name="Прямая соединительная линия 8">
+            <a:extLst>
+              <a:ext uri="{FF2B5EF4-FFF2-40B4-BE49-F238E27FC236}">
+                <a16:creationId xmlns:a16="http://schemas.microsoft.com/office/drawing/2014/main" id="{8A0B85AB-B544-4ECE-AF8C-C25AC44F264C}"/>
+              </a:ext>
+            </a:extLst>
+          </p:cNvPr>
+          <p:cNvCxnSpPr/>
+          <p:nvPr/>
+        </p:nvCxnSpPr>
+        <p:spPr>
+          <a:xfrm>
+            <a:off x="1079862" y="1349831"/>
+            <a:ext cx="5390607" cy="0"/>
+          </a:xfrm>
+          <a:prstGeom prst="line">
+            <a:avLst/>
+          </a:prstGeom>
+          <a:ln/>
+        </p:spPr>
+        <p:style>
+          <a:lnRef idx="3">
+            <a:schemeClr val="dk1"/>
+          </a:lnRef>
+          <a:fillRef idx="0">
+            <a:schemeClr val="dk1"/>
+          </a:fillRef>
+          <a:effectRef idx="2">
+            <a:schemeClr val="dk1"/>
+          </a:effectRef>
+          <a:fontRef idx="minor">
+            <a:schemeClr val="tx1"/>
+          </a:fontRef>
+        </p:style>
+      </p:cxnSp>
+      <p:sp>
+        <p:nvSpPr>
+          <p:cNvPr id="3" name="TextBox 2">
+            <a:extLst>
+              <a:ext uri="{FF2B5EF4-FFF2-40B4-BE49-F238E27FC236}">
+                <a16:creationId xmlns:a16="http://schemas.microsoft.com/office/drawing/2014/main" id="{16BBA9CB-5082-F48F-8501-F14063CBA6FF}"/>
+              </a:ext>
+            </a:extLst>
+          </p:cNvPr>
+          <p:cNvSpPr txBox="1"/>
+          <p:nvPr/>
+        </p:nvSpPr>
+        <p:spPr>
+          <a:xfrm>
+            <a:off x="10458815" y="6152152"/>
+            <a:ext cx="1274773" cy="369332"/>
+          </a:xfrm>
+          <a:prstGeom prst="rect">
+            <a:avLst/>
+          </a:prstGeom>
+          <a:noFill/>
+        </p:spPr>
+        <p:txBody>
+          <a:bodyPr wrap="none" rtlCol="0">
+            <a:spAutoFit/>
+          </a:bodyPr>
+          <a:lstStyle/>
+          <a:p>
+            <a:r>
+              <a:rPr lang="en-US" dirty="0">
+                <a:solidFill>
+                  <a:schemeClr val="accent2"/>
+                </a:solidFill>
+                <a:hlinkClick r:id="rId2">
+                  <a:extLst>
+                    <a:ext uri="{A12FA001-AC4F-418D-AE19-62706E023703}">
+                      <ahyp:hlinkClr xmlns:ahyp="http://schemas.microsoft.com/office/drawing/2018/hyperlinkcolor" val="tx"/>
+                    </a:ext>
+                  </a:extLst>
+                </a:hlinkClick>
+              </a:rPr>
+              <a:t>godbolt.org</a:t>
+            </a:r>
+            <a:endParaRPr lang="ru-RU" dirty="0">
+              <a:solidFill>
+                <a:schemeClr val="accent2"/>
+              </a:solidFill>
+            </a:endParaRPr>
+          </a:p>
+        </p:txBody>
+      </p:sp>
+      <p:sp>
+        <p:nvSpPr>
+          <p:cNvPr id="8" name="TextBox 7">
+            <a:extLst>
+              <a:ext uri="{FF2B5EF4-FFF2-40B4-BE49-F238E27FC236}">
+                <a16:creationId xmlns:a16="http://schemas.microsoft.com/office/drawing/2014/main" id="{87056931-9D3F-3555-042B-26D505746B81}"/>
+              </a:ext>
+            </a:extLst>
+          </p:cNvPr>
+          <p:cNvSpPr txBox="1"/>
+          <p:nvPr/>
+        </p:nvSpPr>
+        <p:spPr>
+          <a:xfrm>
+            <a:off x="975360" y="1349831"/>
+            <a:ext cx="8301205" cy="5078313"/>
+          </a:xfrm>
+          <a:prstGeom prst="rect">
+            <a:avLst/>
+          </a:prstGeom>
+          <a:noFill/>
+        </p:spPr>
+        <p:txBody>
+          <a:bodyPr wrap="square">
+            <a:spAutoFit/>
+          </a:bodyPr>
+          <a:lstStyle/>
+          <a:p>
+            <a:r>
+              <a:rPr lang="en-US" sz="1800" dirty="0">
+                <a:solidFill>
+                  <a:srgbClr val="0000FF"/>
+                </a:solidFill>
+                <a:latin typeface="Consolas" panose="020B0609020204030204" pitchFamily="49" charset="0"/>
+              </a:rPr>
+              <a:t>int</a:t>
+            </a:r>
+            <a:r>
+              <a:rPr lang="en-US" sz="1800" dirty="0">
+                <a:solidFill>
+                  <a:srgbClr val="000000"/>
+                </a:solidFill>
+                <a:latin typeface="Consolas" panose="020B0609020204030204" pitchFamily="49" charset="0"/>
+              </a:rPr>
+              <a:t> </a:t>
+            </a:r>
+            <a:r>
+              <a:rPr lang="en-US" sz="1800" dirty="0" err="1">
+                <a:latin typeface="Consolas" panose="020B0609020204030204" pitchFamily="49" charset="0"/>
+              </a:rPr>
+              <a:t>binary_search</a:t>
+            </a:r>
+            <a:r>
+              <a:rPr lang="en-US" sz="1800" dirty="0">
+                <a:solidFill>
+                  <a:srgbClr val="000000"/>
+                </a:solidFill>
+                <a:latin typeface="Consolas" panose="020B0609020204030204" pitchFamily="49" charset="0"/>
+              </a:rPr>
+              <a:t>(</a:t>
+            </a:r>
+            <a:r>
+              <a:rPr lang="en-US" sz="1800" i="1" dirty="0">
+                <a:solidFill>
+                  <a:srgbClr val="0000FF"/>
+                </a:solidFill>
+                <a:latin typeface="Consolas" panose="020B0609020204030204" pitchFamily="49" charset="0"/>
+              </a:rPr>
+              <a:t>vector</a:t>
+            </a:r>
+            <a:r>
+              <a:rPr lang="en-US" sz="1800" i="0" dirty="0">
+                <a:solidFill>
+                  <a:srgbClr val="000000"/>
+                </a:solidFill>
+                <a:latin typeface="Consolas" panose="020B0609020204030204" pitchFamily="49" charset="0"/>
+              </a:rPr>
+              <a:t>&lt;</a:t>
+            </a:r>
+            <a:r>
+              <a:rPr lang="en-US" sz="1800" i="0" dirty="0">
+                <a:solidFill>
+                  <a:srgbClr val="0000FF"/>
+                </a:solidFill>
+                <a:latin typeface="Consolas" panose="020B0609020204030204" pitchFamily="49" charset="0"/>
+              </a:rPr>
+              <a:t>int</a:t>
+            </a:r>
+            <a:r>
+              <a:rPr lang="en-US" sz="1800" i="0" dirty="0">
+                <a:solidFill>
+                  <a:srgbClr val="000000"/>
+                </a:solidFill>
+                <a:latin typeface="Consolas" panose="020B0609020204030204" pitchFamily="49" charset="0"/>
+              </a:rPr>
+              <a:t>&gt;&amp; </a:t>
+            </a:r>
+            <a:r>
+              <a:rPr lang="en-US" sz="1800" i="0" dirty="0">
+                <a:solidFill>
+                  <a:srgbClr val="000080"/>
+                </a:solidFill>
+                <a:latin typeface="Consolas" panose="020B0609020204030204" pitchFamily="49" charset="0"/>
+              </a:rPr>
+              <a:t>v</a:t>
+            </a:r>
+            <a:r>
+              <a:rPr lang="en-US" sz="1800" i="0" dirty="0">
+                <a:solidFill>
+                  <a:srgbClr val="000000"/>
+                </a:solidFill>
+                <a:latin typeface="Consolas" panose="020B0609020204030204" pitchFamily="49" charset="0"/>
+              </a:rPr>
+              <a:t>, </a:t>
+            </a:r>
+            <a:r>
+              <a:rPr lang="en-US" sz="1800" i="0" dirty="0">
+                <a:solidFill>
+                  <a:srgbClr val="0000FF"/>
+                </a:solidFill>
+                <a:latin typeface="Consolas" panose="020B0609020204030204" pitchFamily="49" charset="0"/>
+              </a:rPr>
+              <a:t>int</a:t>
+            </a:r>
+            <a:r>
+              <a:rPr lang="en-US" sz="1800" i="0" dirty="0">
+                <a:solidFill>
+                  <a:srgbClr val="000000"/>
+                </a:solidFill>
+                <a:latin typeface="Consolas" panose="020B0609020204030204" pitchFamily="49" charset="0"/>
+              </a:rPr>
+              <a:t> </a:t>
+            </a:r>
+            <a:r>
+              <a:rPr lang="en-US" sz="1800" i="0" dirty="0">
+                <a:solidFill>
+                  <a:srgbClr val="000080"/>
+                </a:solidFill>
+                <a:latin typeface="Consolas" panose="020B0609020204030204" pitchFamily="49" charset="0"/>
+              </a:rPr>
+              <a:t>x</a:t>
+            </a:r>
+            <a:r>
+              <a:rPr lang="en-US" sz="1800" i="0" dirty="0">
+                <a:solidFill>
+                  <a:srgbClr val="000000"/>
+                </a:solidFill>
+                <a:latin typeface="Consolas" panose="020B0609020204030204" pitchFamily="49" charset="0"/>
+              </a:rPr>
+              <a:t>) {</a:t>
+            </a:r>
+          </a:p>
+          <a:p>
+            <a:pPr lvl="1"/>
+            <a:r>
+              <a:rPr lang="en-US" i="0" dirty="0">
+                <a:solidFill>
+                  <a:srgbClr val="0000FF"/>
+                </a:solidFill>
+                <a:latin typeface="Consolas" panose="020B0609020204030204" pitchFamily="49" charset="0"/>
+              </a:rPr>
+              <a:t>int</a:t>
+            </a:r>
+            <a:r>
+              <a:rPr lang="en-US" i="0" dirty="0">
+                <a:solidFill>
+                  <a:srgbClr val="000000"/>
+                </a:solidFill>
+                <a:latin typeface="Consolas" panose="020B0609020204030204" pitchFamily="49" charset="0"/>
+              </a:rPr>
+              <a:t> </a:t>
+            </a:r>
+            <a:r>
+              <a:rPr lang="en-US" i="0" dirty="0">
+                <a:solidFill>
+                  <a:srgbClr val="000080"/>
+                </a:solidFill>
+                <a:latin typeface="Consolas" panose="020B0609020204030204" pitchFamily="49" charset="0"/>
+              </a:rPr>
+              <a:t>begin</a:t>
+            </a:r>
+            <a:r>
+              <a:rPr lang="en-US" i="0" dirty="0">
+                <a:solidFill>
+                  <a:srgbClr val="000000"/>
+                </a:solidFill>
+                <a:latin typeface="Consolas" panose="020B0609020204030204" pitchFamily="49" charset="0"/>
+              </a:rPr>
+              <a:t> = 0; </a:t>
+            </a:r>
+            <a:r>
+              <a:rPr lang="en-US" i="0" dirty="0">
+                <a:solidFill>
+                  <a:srgbClr val="0000FF"/>
+                </a:solidFill>
+                <a:latin typeface="Consolas" panose="020B0609020204030204" pitchFamily="49" charset="0"/>
+              </a:rPr>
+              <a:t>int</a:t>
+            </a:r>
+            <a:r>
+              <a:rPr lang="en-US" i="0" dirty="0">
+                <a:solidFill>
+                  <a:srgbClr val="000000"/>
+                </a:solidFill>
+                <a:latin typeface="Consolas" panose="020B0609020204030204" pitchFamily="49" charset="0"/>
+              </a:rPr>
+              <a:t> </a:t>
+            </a:r>
+            <a:r>
+              <a:rPr lang="en-US" i="0" dirty="0">
+                <a:solidFill>
+                  <a:srgbClr val="000080"/>
+                </a:solidFill>
+                <a:latin typeface="Consolas" panose="020B0609020204030204" pitchFamily="49" charset="0"/>
+              </a:rPr>
+              <a:t>end</a:t>
+            </a:r>
+            <a:r>
+              <a:rPr lang="en-US" i="0" dirty="0">
+                <a:solidFill>
+                  <a:srgbClr val="000000"/>
+                </a:solidFill>
+                <a:latin typeface="Consolas" panose="020B0609020204030204" pitchFamily="49" charset="0"/>
+              </a:rPr>
+              <a:t> = </a:t>
+            </a:r>
+            <a:r>
+              <a:rPr lang="en-US" i="0" dirty="0" err="1">
+                <a:solidFill>
+                  <a:srgbClr val="000080"/>
+                </a:solidFill>
+                <a:latin typeface="Consolas" panose="020B0609020204030204" pitchFamily="49" charset="0"/>
+              </a:rPr>
+              <a:t>v</a:t>
+            </a:r>
+            <a:r>
+              <a:rPr lang="en-US" i="0" dirty="0" err="1">
+                <a:solidFill>
+                  <a:srgbClr val="000000"/>
+                </a:solidFill>
+                <a:latin typeface="Consolas" panose="020B0609020204030204" pitchFamily="49" charset="0"/>
+              </a:rPr>
+              <a:t>.</a:t>
+            </a:r>
+            <a:r>
+              <a:rPr lang="en-US" i="1" dirty="0" err="1">
+                <a:solidFill>
+                  <a:srgbClr val="880000"/>
+                </a:solidFill>
+                <a:latin typeface="Consolas" panose="020B0609020204030204" pitchFamily="49" charset="0"/>
+              </a:rPr>
+              <a:t>size</a:t>
+            </a:r>
+            <a:r>
+              <a:rPr lang="en-US" i="0" dirty="0">
+                <a:solidFill>
+                  <a:srgbClr val="000000"/>
+                </a:solidFill>
+                <a:latin typeface="Consolas" panose="020B0609020204030204" pitchFamily="49" charset="0"/>
+              </a:rPr>
+              <a:t>() - 1;</a:t>
+            </a:r>
+          </a:p>
+          <a:p>
+            <a:pPr lvl="1"/>
+            <a:endParaRPr lang="ru-RU" i="0" dirty="0">
+              <a:solidFill>
+                <a:srgbClr val="000000"/>
+              </a:solidFill>
+              <a:latin typeface="Consolas" panose="020B0609020204030204" pitchFamily="49" charset="0"/>
+            </a:endParaRPr>
+          </a:p>
+          <a:p>
+            <a:pPr lvl="1"/>
+            <a:r>
+              <a:rPr lang="en-US" i="0" dirty="0">
+                <a:solidFill>
+                  <a:srgbClr val="0000FF"/>
+                </a:solidFill>
+                <a:latin typeface="Consolas" panose="020B0609020204030204" pitchFamily="49" charset="0"/>
+              </a:rPr>
+              <a:t>while</a:t>
+            </a:r>
+            <a:r>
+              <a:rPr lang="en-US" i="0" dirty="0">
+                <a:solidFill>
+                  <a:srgbClr val="000000"/>
+                </a:solidFill>
+                <a:latin typeface="Consolas" panose="020B0609020204030204" pitchFamily="49" charset="0"/>
+              </a:rPr>
+              <a:t> (</a:t>
+            </a:r>
+            <a:r>
+              <a:rPr lang="en-US" i="0" dirty="0">
+                <a:solidFill>
+                  <a:srgbClr val="000080"/>
+                </a:solidFill>
+                <a:latin typeface="Consolas" panose="020B0609020204030204" pitchFamily="49" charset="0"/>
+              </a:rPr>
+              <a:t>begin</a:t>
+            </a:r>
+            <a:r>
+              <a:rPr lang="en-US" i="0" dirty="0">
+                <a:solidFill>
+                  <a:srgbClr val="000000"/>
+                </a:solidFill>
+                <a:latin typeface="Consolas" panose="020B0609020204030204" pitchFamily="49" charset="0"/>
+              </a:rPr>
+              <a:t> &lt;= </a:t>
+            </a:r>
+            <a:r>
+              <a:rPr lang="en-US" i="0" dirty="0">
+                <a:solidFill>
+                  <a:srgbClr val="000080"/>
+                </a:solidFill>
+                <a:latin typeface="Consolas" panose="020B0609020204030204" pitchFamily="49" charset="0"/>
+              </a:rPr>
+              <a:t>end</a:t>
+            </a:r>
+            <a:r>
+              <a:rPr lang="en-US" i="0" dirty="0">
+                <a:solidFill>
+                  <a:srgbClr val="000000"/>
+                </a:solidFill>
+                <a:latin typeface="Consolas" panose="020B0609020204030204" pitchFamily="49" charset="0"/>
+              </a:rPr>
+              <a:t>) {</a:t>
+            </a:r>
+          </a:p>
+          <a:p>
+            <a:pPr lvl="2"/>
+            <a:r>
+              <a:rPr lang="en-US" i="0" dirty="0">
+                <a:solidFill>
+                  <a:srgbClr val="0000FF"/>
+                </a:solidFill>
+                <a:latin typeface="Consolas" panose="020B0609020204030204" pitchFamily="49" charset="0"/>
+              </a:rPr>
+              <a:t>int</a:t>
+            </a:r>
+            <a:r>
+              <a:rPr lang="en-US" i="0" dirty="0">
+                <a:solidFill>
+                  <a:srgbClr val="000000"/>
+                </a:solidFill>
+                <a:latin typeface="Consolas" panose="020B0609020204030204" pitchFamily="49" charset="0"/>
+              </a:rPr>
+              <a:t> </a:t>
+            </a:r>
+            <a:r>
+              <a:rPr lang="en-US" i="0" dirty="0">
+                <a:solidFill>
+                  <a:srgbClr val="000080"/>
+                </a:solidFill>
+                <a:latin typeface="Consolas" panose="020B0609020204030204" pitchFamily="49" charset="0"/>
+              </a:rPr>
+              <a:t>mid</a:t>
+            </a:r>
+            <a:r>
+              <a:rPr lang="en-US" i="0" dirty="0">
+                <a:solidFill>
+                  <a:srgbClr val="000000"/>
+                </a:solidFill>
+                <a:latin typeface="Consolas" panose="020B0609020204030204" pitchFamily="49" charset="0"/>
+              </a:rPr>
+              <a:t> = (</a:t>
+            </a:r>
+            <a:r>
+              <a:rPr lang="en-US" i="0" dirty="0">
+                <a:solidFill>
+                  <a:srgbClr val="000080"/>
+                </a:solidFill>
+                <a:latin typeface="Consolas" panose="020B0609020204030204" pitchFamily="49" charset="0"/>
+              </a:rPr>
+              <a:t>begin</a:t>
+            </a:r>
+            <a:r>
+              <a:rPr lang="en-US" i="0" dirty="0">
+                <a:solidFill>
+                  <a:srgbClr val="000000"/>
+                </a:solidFill>
+                <a:latin typeface="Consolas" panose="020B0609020204030204" pitchFamily="49" charset="0"/>
+              </a:rPr>
+              <a:t> + </a:t>
+            </a:r>
+            <a:r>
+              <a:rPr lang="en-US" i="0" dirty="0">
+                <a:solidFill>
+                  <a:srgbClr val="000080"/>
+                </a:solidFill>
+                <a:latin typeface="Consolas" panose="020B0609020204030204" pitchFamily="49" charset="0"/>
+              </a:rPr>
+              <a:t>end</a:t>
+            </a:r>
+            <a:r>
+              <a:rPr lang="en-US" i="0" dirty="0">
+                <a:solidFill>
+                  <a:srgbClr val="000000"/>
+                </a:solidFill>
+                <a:latin typeface="Consolas" panose="020B0609020204030204" pitchFamily="49" charset="0"/>
+              </a:rPr>
+              <a:t>) / 2;</a:t>
+            </a:r>
+          </a:p>
+          <a:p>
+            <a:pPr lvl="2"/>
+            <a:endParaRPr lang="ru-RU" i="0" dirty="0">
+              <a:solidFill>
+                <a:srgbClr val="000000"/>
+              </a:solidFill>
+              <a:latin typeface="Consolas" panose="020B0609020204030204" pitchFamily="49" charset="0"/>
+            </a:endParaRPr>
+          </a:p>
+          <a:p>
+            <a:pPr lvl="2"/>
+            <a:r>
+              <a:rPr lang="en-US" i="0" dirty="0">
+                <a:solidFill>
+                  <a:srgbClr val="008000"/>
+                </a:solidFill>
+                <a:latin typeface="Consolas" panose="020B0609020204030204" pitchFamily="49" charset="0"/>
+              </a:rPr>
+              <a:t>/* x founded */</a:t>
+            </a:r>
+            <a:endParaRPr lang="en-US" i="0" dirty="0">
+              <a:solidFill>
+                <a:srgbClr val="000000"/>
+              </a:solidFill>
+              <a:latin typeface="Consolas" panose="020B0609020204030204" pitchFamily="49" charset="0"/>
+            </a:endParaRPr>
+          </a:p>
+          <a:p>
+            <a:pPr lvl="2"/>
+            <a:r>
+              <a:rPr lang="en-US" i="0" dirty="0">
+                <a:solidFill>
+                  <a:srgbClr val="0000FF"/>
+                </a:solidFill>
+                <a:latin typeface="Consolas" panose="020B0609020204030204" pitchFamily="49" charset="0"/>
+              </a:rPr>
+              <a:t>if</a:t>
+            </a:r>
+            <a:r>
+              <a:rPr lang="en-US" i="0" dirty="0">
+                <a:solidFill>
+                  <a:srgbClr val="000000"/>
+                </a:solidFill>
+                <a:latin typeface="Consolas" panose="020B0609020204030204" pitchFamily="49" charset="0"/>
+              </a:rPr>
+              <a:t> (</a:t>
+            </a:r>
+            <a:r>
+              <a:rPr lang="en-US" i="0" dirty="0">
+                <a:solidFill>
+                  <a:srgbClr val="000080"/>
+                </a:solidFill>
+                <a:latin typeface="Consolas" panose="020B0609020204030204" pitchFamily="49" charset="0"/>
+              </a:rPr>
+              <a:t>v</a:t>
+            </a:r>
+            <a:r>
+              <a:rPr lang="en-US" i="0" dirty="0">
+                <a:solidFill>
+                  <a:srgbClr val="000000"/>
+                </a:solidFill>
+                <a:latin typeface="Consolas" panose="020B0609020204030204" pitchFamily="49" charset="0"/>
+              </a:rPr>
+              <a:t>[</a:t>
+            </a:r>
+            <a:r>
+              <a:rPr lang="en-US" i="0" dirty="0">
+                <a:solidFill>
+                  <a:srgbClr val="000080"/>
+                </a:solidFill>
+                <a:latin typeface="Consolas" panose="020B0609020204030204" pitchFamily="49" charset="0"/>
+              </a:rPr>
+              <a:t>mid</a:t>
+            </a:r>
+            <a:r>
+              <a:rPr lang="en-US" i="0" dirty="0">
+                <a:solidFill>
+                  <a:srgbClr val="000000"/>
+                </a:solidFill>
+                <a:latin typeface="Consolas" panose="020B0609020204030204" pitchFamily="49" charset="0"/>
+              </a:rPr>
+              <a:t>] == </a:t>
+            </a:r>
+            <a:r>
+              <a:rPr lang="en-US" i="0" dirty="0">
+                <a:solidFill>
+                  <a:srgbClr val="000080"/>
+                </a:solidFill>
+                <a:latin typeface="Consolas" panose="020B0609020204030204" pitchFamily="49" charset="0"/>
+              </a:rPr>
+              <a:t>x</a:t>
+            </a:r>
+            <a:r>
+              <a:rPr lang="en-US" i="0" dirty="0">
+                <a:solidFill>
+                  <a:srgbClr val="000000"/>
+                </a:solidFill>
+                <a:latin typeface="Consolas" panose="020B0609020204030204" pitchFamily="49" charset="0"/>
+              </a:rPr>
+              <a:t>) </a:t>
+            </a:r>
+            <a:r>
+              <a:rPr lang="ru-RU" i="0" dirty="0">
+                <a:solidFill>
+                  <a:srgbClr val="000000"/>
+                </a:solidFill>
+                <a:latin typeface="Consolas" panose="020B0609020204030204" pitchFamily="49" charset="0"/>
+              </a:rPr>
+              <a:t> </a:t>
+            </a:r>
+            <a:r>
+              <a:rPr lang="en-US" i="0" dirty="0">
+                <a:solidFill>
+                  <a:srgbClr val="0000FF"/>
+                </a:solidFill>
+                <a:latin typeface="Consolas" panose="020B0609020204030204" pitchFamily="49" charset="0"/>
+              </a:rPr>
+              <a:t>return</a:t>
+            </a:r>
+            <a:r>
+              <a:rPr lang="en-US" i="0" dirty="0">
+                <a:solidFill>
+                  <a:srgbClr val="000000"/>
+                </a:solidFill>
+                <a:latin typeface="Consolas" panose="020B0609020204030204" pitchFamily="49" charset="0"/>
+              </a:rPr>
+              <a:t> </a:t>
+            </a:r>
+            <a:r>
+              <a:rPr lang="en-US" i="0" dirty="0">
+                <a:solidFill>
+                  <a:srgbClr val="000080"/>
+                </a:solidFill>
+                <a:latin typeface="Consolas" panose="020B0609020204030204" pitchFamily="49" charset="0"/>
+              </a:rPr>
+              <a:t>mid</a:t>
+            </a:r>
+            <a:r>
+              <a:rPr lang="en-US" i="0" dirty="0">
+                <a:solidFill>
+                  <a:srgbClr val="000000"/>
+                </a:solidFill>
+                <a:latin typeface="Consolas" panose="020B0609020204030204" pitchFamily="49" charset="0"/>
+              </a:rPr>
+              <a:t>;</a:t>
+            </a:r>
+          </a:p>
+          <a:p>
+            <a:pPr lvl="2"/>
+            <a:endParaRPr lang="ru-RU" i="0" dirty="0">
+              <a:solidFill>
+                <a:srgbClr val="000000"/>
+              </a:solidFill>
+              <a:latin typeface="Consolas" panose="020B0609020204030204" pitchFamily="49" charset="0"/>
+            </a:endParaRPr>
+          </a:p>
+          <a:p>
+            <a:pPr lvl="2"/>
+            <a:r>
+              <a:rPr lang="en-US" i="0" dirty="0">
+                <a:solidFill>
+                  <a:srgbClr val="008000"/>
+                </a:solidFill>
+                <a:latin typeface="Consolas" panose="020B0609020204030204" pitchFamily="49" charset="0"/>
+              </a:rPr>
+              <a:t>/* x at the left side */</a:t>
+            </a:r>
+            <a:endParaRPr lang="en-US" i="0" dirty="0">
+              <a:solidFill>
+                <a:srgbClr val="000000"/>
+              </a:solidFill>
+              <a:latin typeface="Consolas" panose="020B0609020204030204" pitchFamily="49" charset="0"/>
+            </a:endParaRPr>
+          </a:p>
+          <a:p>
+            <a:pPr lvl="2"/>
+            <a:r>
+              <a:rPr lang="en-US" i="0" dirty="0">
+                <a:solidFill>
+                  <a:srgbClr val="0000FF"/>
+                </a:solidFill>
+                <a:latin typeface="Consolas" panose="020B0609020204030204" pitchFamily="49" charset="0"/>
+              </a:rPr>
+              <a:t>else</a:t>
+            </a:r>
+            <a:r>
+              <a:rPr lang="en-US" i="0" dirty="0">
+                <a:solidFill>
+                  <a:srgbClr val="000000"/>
+                </a:solidFill>
+                <a:latin typeface="Consolas" panose="020B0609020204030204" pitchFamily="49" charset="0"/>
+              </a:rPr>
+              <a:t> </a:t>
+            </a:r>
+            <a:r>
+              <a:rPr lang="en-US" i="0" dirty="0">
+                <a:solidFill>
+                  <a:srgbClr val="0000FF"/>
+                </a:solidFill>
+                <a:latin typeface="Consolas" panose="020B0609020204030204" pitchFamily="49" charset="0"/>
+              </a:rPr>
+              <a:t>if</a:t>
+            </a:r>
+            <a:r>
+              <a:rPr lang="en-US" i="0" dirty="0">
+                <a:solidFill>
+                  <a:srgbClr val="000000"/>
+                </a:solidFill>
+                <a:latin typeface="Consolas" panose="020B0609020204030204" pitchFamily="49" charset="0"/>
+              </a:rPr>
+              <a:t> (</a:t>
+            </a:r>
+            <a:r>
+              <a:rPr lang="en-US" i="0" dirty="0">
+                <a:solidFill>
+                  <a:srgbClr val="000080"/>
+                </a:solidFill>
+                <a:latin typeface="Consolas" panose="020B0609020204030204" pitchFamily="49" charset="0"/>
+              </a:rPr>
+              <a:t>v</a:t>
+            </a:r>
+            <a:r>
+              <a:rPr lang="en-US" i="0" dirty="0">
+                <a:solidFill>
+                  <a:srgbClr val="000000"/>
+                </a:solidFill>
+                <a:latin typeface="Consolas" panose="020B0609020204030204" pitchFamily="49" charset="0"/>
+              </a:rPr>
+              <a:t>[</a:t>
+            </a:r>
+            <a:r>
+              <a:rPr lang="en-US" i="0" dirty="0">
+                <a:solidFill>
+                  <a:srgbClr val="000080"/>
+                </a:solidFill>
+                <a:latin typeface="Consolas" panose="020B0609020204030204" pitchFamily="49" charset="0"/>
+              </a:rPr>
+              <a:t>mid</a:t>
+            </a:r>
+            <a:r>
+              <a:rPr lang="en-US" i="0" dirty="0">
+                <a:solidFill>
+                  <a:srgbClr val="000000"/>
+                </a:solidFill>
+                <a:latin typeface="Consolas" panose="020B0609020204030204" pitchFamily="49" charset="0"/>
+              </a:rPr>
+              <a:t>] &gt; </a:t>
+            </a:r>
+            <a:r>
+              <a:rPr lang="en-US" i="0" dirty="0">
+                <a:solidFill>
+                  <a:srgbClr val="000080"/>
+                </a:solidFill>
+                <a:latin typeface="Consolas" panose="020B0609020204030204" pitchFamily="49" charset="0"/>
+              </a:rPr>
+              <a:t>x</a:t>
+            </a:r>
+            <a:r>
+              <a:rPr lang="en-US" i="0" dirty="0">
+                <a:solidFill>
+                  <a:srgbClr val="000000"/>
+                </a:solidFill>
+                <a:latin typeface="Consolas" panose="020B0609020204030204" pitchFamily="49" charset="0"/>
+              </a:rPr>
+              <a:t>) </a:t>
+            </a:r>
+            <a:r>
+              <a:rPr lang="en-US" i="0" dirty="0">
+                <a:solidFill>
+                  <a:srgbClr val="000080"/>
+                </a:solidFill>
+                <a:latin typeface="Consolas" panose="020B0609020204030204" pitchFamily="49" charset="0"/>
+              </a:rPr>
+              <a:t>end</a:t>
+            </a:r>
+            <a:r>
+              <a:rPr lang="en-US" i="0" dirty="0">
+                <a:solidFill>
+                  <a:srgbClr val="000000"/>
+                </a:solidFill>
+                <a:latin typeface="Consolas" panose="020B0609020204030204" pitchFamily="49" charset="0"/>
+              </a:rPr>
+              <a:t> = </a:t>
+            </a:r>
+            <a:r>
+              <a:rPr lang="en-US" i="0" dirty="0">
+                <a:solidFill>
+                  <a:srgbClr val="000080"/>
+                </a:solidFill>
+                <a:latin typeface="Consolas" panose="020B0609020204030204" pitchFamily="49" charset="0"/>
+              </a:rPr>
+              <a:t>mid</a:t>
+            </a:r>
+            <a:r>
+              <a:rPr lang="en-US" i="0" dirty="0">
+                <a:solidFill>
+                  <a:srgbClr val="000000"/>
+                </a:solidFill>
+                <a:latin typeface="Consolas" panose="020B0609020204030204" pitchFamily="49" charset="0"/>
+              </a:rPr>
+              <a:t> - 1;</a:t>
+            </a:r>
+          </a:p>
+          <a:p>
+            <a:pPr lvl="2"/>
+            <a:endParaRPr lang="ru-RU" i="0" dirty="0">
+              <a:solidFill>
+                <a:srgbClr val="000000"/>
+              </a:solidFill>
+              <a:latin typeface="Consolas" panose="020B0609020204030204" pitchFamily="49" charset="0"/>
+            </a:endParaRPr>
+          </a:p>
+          <a:p>
+            <a:pPr lvl="2"/>
+            <a:r>
+              <a:rPr lang="en-US" i="0" dirty="0">
+                <a:solidFill>
+                  <a:srgbClr val="008000"/>
+                </a:solidFill>
+                <a:latin typeface="Consolas" panose="020B0609020204030204" pitchFamily="49" charset="0"/>
+              </a:rPr>
+              <a:t>/* x at the right side */</a:t>
+            </a:r>
+            <a:endParaRPr lang="en-US" i="0" dirty="0">
+              <a:solidFill>
+                <a:srgbClr val="000000"/>
+              </a:solidFill>
+              <a:latin typeface="Consolas" panose="020B0609020204030204" pitchFamily="49" charset="0"/>
+            </a:endParaRPr>
+          </a:p>
+          <a:p>
+            <a:pPr lvl="2"/>
+            <a:r>
+              <a:rPr lang="en-US" i="0" dirty="0">
+                <a:solidFill>
+                  <a:srgbClr val="0000FF"/>
+                </a:solidFill>
+                <a:latin typeface="Consolas" panose="020B0609020204030204" pitchFamily="49" charset="0"/>
+              </a:rPr>
+              <a:t>else</a:t>
+            </a:r>
+            <a:r>
+              <a:rPr lang="ru-RU" dirty="0">
+                <a:solidFill>
+                  <a:srgbClr val="000000"/>
+                </a:solidFill>
+                <a:latin typeface="Consolas" panose="020B0609020204030204" pitchFamily="49" charset="0"/>
+              </a:rPr>
+              <a:t> </a:t>
+            </a:r>
+            <a:r>
+              <a:rPr lang="en-US" i="0" dirty="0">
+                <a:solidFill>
+                  <a:srgbClr val="000080"/>
+                </a:solidFill>
+                <a:latin typeface="Consolas" panose="020B0609020204030204" pitchFamily="49" charset="0"/>
+              </a:rPr>
+              <a:t>begin</a:t>
+            </a:r>
+            <a:r>
+              <a:rPr lang="en-US" i="0" dirty="0">
+                <a:solidFill>
+                  <a:srgbClr val="000000"/>
+                </a:solidFill>
+                <a:latin typeface="Consolas" panose="020B0609020204030204" pitchFamily="49" charset="0"/>
+              </a:rPr>
+              <a:t> = </a:t>
+            </a:r>
+            <a:r>
+              <a:rPr lang="en-US" i="0" dirty="0">
+                <a:solidFill>
+                  <a:srgbClr val="000080"/>
+                </a:solidFill>
+                <a:latin typeface="Consolas" panose="020B0609020204030204" pitchFamily="49" charset="0"/>
+              </a:rPr>
+              <a:t>mid</a:t>
+            </a:r>
+            <a:r>
+              <a:rPr lang="en-US" i="0" dirty="0">
+                <a:solidFill>
+                  <a:srgbClr val="000000"/>
+                </a:solidFill>
+                <a:latin typeface="Consolas" panose="020B0609020204030204" pitchFamily="49" charset="0"/>
+              </a:rPr>
+              <a:t> + 1;</a:t>
+            </a:r>
+          </a:p>
+          <a:p>
+            <a:pPr lvl="1"/>
+            <a:r>
+              <a:rPr lang="ru-RU" i="0" dirty="0">
+                <a:solidFill>
+                  <a:srgbClr val="000000"/>
+                </a:solidFill>
+                <a:latin typeface="Consolas" panose="020B0609020204030204" pitchFamily="49" charset="0"/>
+              </a:rPr>
+              <a:t>}</a:t>
+            </a:r>
+          </a:p>
+          <a:p>
+            <a:endParaRPr lang="ru-RU" sz="1800" i="0" dirty="0">
+              <a:solidFill>
+                <a:srgbClr val="000000"/>
+              </a:solidFill>
+              <a:latin typeface="Consolas" panose="020B0609020204030204" pitchFamily="49" charset="0"/>
+            </a:endParaRPr>
+          </a:p>
+          <a:p>
+            <a:r>
+              <a:rPr lang="ru-RU" dirty="0">
+                <a:solidFill>
+                  <a:srgbClr val="0000FF"/>
+                </a:solidFill>
+                <a:latin typeface="Consolas" panose="020B0609020204030204" pitchFamily="49" charset="0"/>
+              </a:rPr>
+              <a:t>    </a:t>
+            </a:r>
+            <a:r>
+              <a:rPr lang="en-US" sz="1800" i="0" dirty="0">
+                <a:solidFill>
+                  <a:srgbClr val="0000FF"/>
+                </a:solidFill>
+                <a:latin typeface="Consolas" panose="020B0609020204030204" pitchFamily="49" charset="0"/>
+              </a:rPr>
+              <a:t>return</a:t>
+            </a:r>
+            <a:r>
+              <a:rPr lang="en-US" sz="1800" i="0" dirty="0">
+                <a:solidFill>
+                  <a:srgbClr val="000000"/>
+                </a:solidFill>
+                <a:latin typeface="Consolas" panose="020B0609020204030204" pitchFamily="49" charset="0"/>
+              </a:rPr>
+              <a:t> -1;</a:t>
+            </a:r>
+          </a:p>
+          <a:p>
+            <a:r>
+              <a:rPr lang="ru-RU" sz="1800" i="0" dirty="0">
+                <a:solidFill>
+                  <a:srgbClr val="000000"/>
+                </a:solidFill>
+                <a:latin typeface="Consolas" panose="020B0609020204030204" pitchFamily="49" charset="0"/>
+              </a:rPr>
+              <a:t>}</a:t>
+            </a:r>
+            <a:endParaRPr lang="en-US" b="0" dirty="0">
+              <a:solidFill>
+                <a:srgbClr val="000000"/>
+              </a:solidFill>
+              <a:effectLst/>
+              <a:latin typeface="Consolas" panose="020B0609020204030204" pitchFamily="49" charset="0"/>
+            </a:endParaRPr>
+          </a:p>
+        </p:txBody>
+      </p:sp>
+    </p:spTree>
+    <p:extLst>
+      <p:ext uri="{BB962C8B-B14F-4D97-AF65-F5344CB8AC3E}">
+        <p14:creationId xmlns:p14="http://schemas.microsoft.com/office/powerpoint/2010/main" val="2369941691"/>
       </p:ext>
     </p:extLst>
   </p:cSld>

</xml_diff>